<commit_message>
W3D5_Project - Danna Ziggy - Update PPT
</commit_message>
<xml_diff>
--- a/8. Pair Project/1. Danna Ziggy/BookManagement.pptx
+++ b/8. Pair Project/1. Danna Ziggy/BookManagement.pptx
@@ -2,7 +2,7 @@
 <file path=ppt/presentation.xml><?xml version="1.0" encoding="utf-8"?>
 <p:presentation xmlns:a="http://schemas.openxmlformats.org/drawingml/2006/main" xmlns:r="http://schemas.openxmlformats.org/officeDocument/2006/relationships" xmlns:p="http://schemas.openxmlformats.org/presentationml/2006/main" saveSubsetFonts="1">
   <p:sldMasterIdLst>
-    <p:sldMasterId id="2147483648" r:id="rId1"/>
+    <p:sldMasterId id="2147483684" r:id="rId1"/>
   </p:sldMasterIdLst>
   <p:sldIdLst>
     <p:sldId id="256" r:id="rId2"/>
@@ -112,8 +112,13 @@
 </file>
 
 <file path=ppt/slideLayouts/slideLayout1.xml><?xml version="1.0" encoding="utf-8"?>
-<p:sldLayout xmlns:a="http://schemas.openxmlformats.org/drawingml/2006/main" xmlns:r="http://schemas.openxmlformats.org/officeDocument/2006/relationships" xmlns:p="http://schemas.openxmlformats.org/presentationml/2006/main" type="title" preserve="1">
+<p:sldLayout xmlns:a="http://schemas.openxmlformats.org/drawingml/2006/main" xmlns:r="http://schemas.openxmlformats.org/officeDocument/2006/relationships" xmlns:p="http://schemas.openxmlformats.org/presentationml/2006/main" showMasterSp="0" type="title" preserve="1">
   <p:cSld name="Title Slide">
+    <p:bg>
+      <p:bgRef idx="1002">
+        <a:schemeClr val="bg2"/>
+      </p:bgRef>
+    </p:bg>
     <p:spTree>
       <p:nvGrpSpPr>
         <p:cNvPr id="1" name=""/>
@@ -130,6 +135,53 @@
       </p:grpSpPr>
       <p:sp>
         <p:nvSpPr>
+          <p:cNvPr id="9" name="Rectangle 8"/>
+          <p:cNvSpPr/>
+          <p:nvPr/>
+        </p:nvSpPr>
+        <p:spPr bwMode="ltGray">
+          <a:xfrm>
+            <a:off x="0" y="0"/>
+            <a:ext cx="9143999" cy="5135430"/>
+          </a:xfrm>
+          <a:prstGeom prst="rect">
+            <a:avLst/>
+          </a:prstGeom>
+          <a:solidFill>
+            <a:srgbClr val="000000"/>
+          </a:solidFill>
+          <a:ln w="48000" cap="flat" cmpd="thickThin" algn="ctr">
+            <a:noFill/>
+            <a:prstDash val="solid"/>
+          </a:ln>
+        </p:spPr>
+        <p:style>
+          <a:lnRef idx="2">
+            <a:schemeClr val="accent1"/>
+          </a:lnRef>
+          <a:fillRef idx="1">
+            <a:schemeClr val="accent1"/>
+          </a:fillRef>
+          <a:effectRef idx="0">
+            <a:schemeClr val="accent1"/>
+          </a:effectRef>
+          <a:fontRef idx="minor">
+            <a:schemeClr val="lt1"/>
+          </a:fontRef>
+        </p:style>
+        <p:txBody>
+          <a:bodyPr rtlCol="0" anchor="ctr"/>
+          <a:lstStyle>
+            <a:extLst/>
+          </a:lstStyle>
+          <a:p>
+            <a:pPr algn="ctr" eaLnBrk="1" latinLnBrk="0" hangingPunct="1"/>
+            <a:endParaRPr kumimoji="0" lang="en-US"/>
+          </a:p>
+        </p:txBody>
+      </p:sp>
+      <p:sp>
+        <p:nvSpPr>
           <p:cNvPr id="2" name="Title 1"/>
           <p:cNvSpPr>
             <a:spLocks noGrp="1"/>
@@ -140,19 +192,35 @@
         </p:nvSpPr>
         <p:spPr>
           <a:xfrm>
-            <a:off x="685800" y="2130425"/>
-            <a:ext cx="7772400" cy="1470025"/>
+            <a:off x="685800" y="3355848"/>
+            <a:ext cx="8077200" cy="1673352"/>
           </a:xfrm>
         </p:spPr>
         <p:txBody>
-          <a:bodyPr/>
-          <a:lstStyle/>
-          <a:p>
-            <a:r>
-              <a:rPr lang="en-US" smtClean="0"/>
+          <a:bodyPr vert="horz" lIns="91440" tIns="0" rIns="45720" bIns="0" rtlCol="0" anchor="t">
+            <a:normAutofit/>
+            <a:scene3d>
+              <a:camera prst="orthographicFront"/>
+              <a:lightRig rig="threePt" dir="t">
+                <a:rot lat="0" lon="0" rev="4800000"/>
+              </a:lightRig>
+            </a:scene3d>
+            <a:sp3d prstMaterial="matte">
+              <a:bevelT w="50800" h="10160"/>
+            </a:sp3d>
+          </a:bodyPr>
+          <a:lstStyle>
+            <a:lvl1pPr algn="l">
+              <a:defRPr sz="4700" b="1"/>
+            </a:lvl1pPr>
+            <a:extLst/>
+          </a:lstStyle>
+          <a:p>
+            <a:r>
+              <a:rPr kumimoji="0" lang="en-US" smtClean="0"/>
               <a:t>Click to edit Master title style</a:t>
             </a:r>
-            <a:endParaRPr lang="en-US"/>
+            <a:endParaRPr kumimoji="0" lang="en-US"/>
           </a:p>
         </p:txBody>
       </p:sp>
@@ -168,20 +236,18 @@
         </p:nvSpPr>
         <p:spPr>
           <a:xfrm>
-            <a:off x="1371600" y="3886200"/>
-            <a:ext cx="6400800" cy="1752600"/>
+            <a:off x="685800" y="1828800"/>
+            <a:ext cx="8077200" cy="1499616"/>
           </a:xfrm>
         </p:spPr>
         <p:txBody>
-          <a:bodyPr/>
+          <a:bodyPr lIns="118872" tIns="0" rIns="45720" bIns="0" anchor="b"/>
           <a:lstStyle>
-            <a:lvl1pPr marL="0" indent="0" algn="ctr">
-              <a:buNone/>
-              <a:defRPr>
+            <a:lvl1pPr marL="0" indent="0" algn="l">
+              <a:buNone/>
+              <a:defRPr sz="2000">
                 <a:solidFill>
-                  <a:schemeClr val="tx1">
-                    <a:tint val="75000"/>
-                  </a:schemeClr>
+                  <a:srgbClr val="FFFFFF"/>
                 </a:solidFill>
               </a:defRPr>
             </a:lvl1pPr>
@@ -265,13 +331,14 @@
                 </a:solidFill>
               </a:defRPr>
             </a:lvl9pPr>
+            <a:extLst/>
           </a:lstStyle>
           <a:p>
             <a:r>
-              <a:rPr lang="en-US" smtClean="0"/>
+              <a:rPr kumimoji="0" lang="en-US" smtClean="0"/>
               <a:t>Click to edit Master subtitle style</a:t>
             </a:r>
-            <a:endParaRPr lang="en-US"/>
+            <a:endParaRPr kumimoji="0" lang="en-US"/>
           </a:p>
         </p:txBody>
       </p:sp>
@@ -342,10 +409,64 @@
           </a:p>
         </p:txBody>
       </p:sp>
+      <p:sp>
+        <p:nvSpPr>
+          <p:cNvPr id="10" name="Rectangle 9"/>
+          <p:cNvSpPr/>
+          <p:nvPr/>
+        </p:nvSpPr>
+        <p:spPr bwMode="invGray">
+          <a:xfrm>
+            <a:off x="0" y="5128334"/>
+            <a:ext cx="9144000" cy="45720"/>
+          </a:xfrm>
+          <a:prstGeom prst="rect">
+            <a:avLst/>
+          </a:prstGeom>
+          <a:solidFill>
+            <a:srgbClr val="FFFFFF"/>
+          </a:solidFill>
+          <a:ln w="48000" cap="flat" cmpd="thickThin" algn="ctr">
+            <a:noFill/>
+            <a:prstDash val="solid"/>
+          </a:ln>
+          <a:effectLst>
+            <a:outerShdw blurRad="31750" dist="10160" dir="5400000" algn="tl" rotWithShape="0">
+              <a:srgbClr val="000000">
+                <a:alpha val="60000"/>
+              </a:srgbClr>
+            </a:outerShdw>
+          </a:effectLst>
+        </p:spPr>
+        <p:style>
+          <a:lnRef idx="2">
+            <a:schemeClr val="accent1"/>
+          </a:lnRef>
+          <a:fillRef idx="1">
+            <a:schemeClr val="accent1"/>
+          </a:fillRef>
+          <a:effectRef idx="0">
+            <a:schemeClr val="accent1"/>
+          </a:effectRef>
+          <a:fontRef idx="minor">
+            <a:schemeClr val="lt1"/>
+          </a:fontRef>
+        </p:style>
+        <p:txBody>
+          <a:bodyPr rtlCol="0" anchor="ctr"/>
+          <a:lstStyle>
+            <a:extLst/>
+          </a:lstStyle>
+          <a:p>
+            <a:pPr algn="ctr" eaLnBrk="1" latinLnBrk="0" hangingPunct="1"/>
+            <a:endParaRPr kumimoji="0" lang="en-US"/>
+          </a:p>
+        </p:txBody>
+      </p:sp>
     </p:spTree>
   </p:cSld>
   <p:clrMapOvr>
-    <a:masterClrMapping/>
+    <a:overrideClrMapping bg1="dk1" tx1="lt1" bg2="dk2" tx2="lt2" accent1="accent1" accent2="accent2" accent3="accent3" accent4="accent4" accent5="accent5" accent6="accent6" hlink="hlink" folHlink="folHlink"/>
   </p:clrMapOvr>
 </p:sldLayout>
 </file>
@@ -380,13 +501,15 @@
         <p:spPr/>
         <p:txBody>
           <a:bodyPr/>
-          <a:lstStyle/>
-          <a:p>
-            <a:r>
-              <a:rPr lang="en-US" smtClean="0"/>
+          <a:lstStyle>
+            <a:extLst/>
+          </a:lstStyle>
+          <a:p>
+            <a:r>
+              <a:rPr kumimoji="0" lang="en-US" smtClean="0"/>
               <a:t>Click to edit Master title style</a:t>
             </a:r>
-            <a:endParaRPr lang="en-US"/>
+            <a:endParaRPr kumimoji="0" lang="en-US"/>
           </a:p>
         </p:txBody>
       </p:sp>
@@ -403,42 +526,44 @@
         <p:spPr/>
         <p:txBody>
           <a:bodyPr vert="eaVert"/>
-          <a:lstStyle/>
-          <a:p>
-            <a:pPr lvl="0"/>
+          <a:lstStyle>
+            <a:extLst/>
+          </a:lstStyle>
+          <a:p>
+            <a:pPr lvl="0" eaLnBrk="1" latinLnBrk="0" hangingPunct="1"/>
             <a:r>
               <a:rPr lang="en-US" smtClean="0"/>
               <a:t>Click to edit Master text styles</a:t>
             </a:r>
           </a:p>
           <a:p>
-            <a:pPr lvl="1"/>
+            <a:pPr lvl="1" eaLnBrk="1" latinLnBrk="0" hangingPunct="1"/>
             <a:r>
               <a:rPr lang="en-US" smtClean="0"/>
               <a:t>Second level</a:t>
             </a:r>
           </a:p>
           <a:p>
-            <a:pPr lvl="2"/>
+            <a:pPr lvl="2" eaLnBrk="1" latinLnBrk="0" hangingPunct="1"/>
             <a:r>
               <a:rPr lang="en-US" smtClean="0"/>
               <a:t>Third level</a:t>
             </a:r>
           </a:p>
           <a:p>
-            <a:pPr lvl="3"/>
+            <a:pPr lvl="3" eaLnBrk="1" latinLnBrk="0" hangingPunct="1"/>
             <a:r>
               <a:rPr lang="en-US" smtClean="0"/>
               <a:t>Fourth level</a:t>
             </a:r>
           </a:p>
           <a:p>
-            <a:pPr lvl="4"/>
+            <a:pPr lvl="4" eaLnBrk="1" latinLnBrk="0" hangingPunct="1"/>
             <a:r>
               <a:rPr lang="en-US" smtClean="0"/>
               <a:t>Fifth level</a:t>
             </a:r>
-            <a:endParaRPr lang="en-US"/>
+            <a:endParaRPr kumimoji="0" lang="en-US"/>
           </a:p>
         </p:txBody>
       </p:sp>
@@ -518,7 +643,7 @@
 </file>
 
 <file path=ppt/slideLayouts/slideLayout11.xml><?xml version="1.0" encoding="utf-8"?>
-<p:sldLayout xmlns:a="http://schemas.openxmlformats.org/drawingml/2006/main" xmlns:r="http://schemas.openxmlformats.org/officeDocument/2006/relationships" xmlns:p="http://schemas.openxmlformats.org/presentationml/2006/main" type="vertTitleAndTx" preserve="1">
+<p:sldLayout xmlns:a="http://schemas.openxmlformats.org/drawingml/2006/main" xmlns:r="http://schemas.openxmlformats.org/officeDocument/2006/relationships" xmlns:p="http://schemas.openxmlformats.org/presentationml/2006/main" showMasterSp="0" type="vertTitleAndTx" preserve="1">
   <p:cSld name="Vertical Title and Text">
     <p:spTree>
       <p:nvGrpSpPr>
@@ -536,6 +661,107 @@
       </p:grpSpPr>
       <p:sp>
         <p:nvSpPr>
+          <p:cNvPr id="9" name="Rectangle 8"/>
+          <p:cNvSpPr/>
+          <p:nvPr/>
+        </p:nvSpPr>
+        <p:spPr bwMode="invGray">
+          <a:xfrm>
+            <a:off x="6598920" y="0"/>
+            <a:ext cx="45720" cy="6858000"/>
+          </a:xfrm>
+          <a:prstGeom prst="rect">
+            <a:avLst/>
+          </a:prstGeom>
+          <a:solidFill>
+            <a:srgbClr val="FFFFFF"/>
+          </a:solidFill>
+          <a:ln w="48000" cap="flat" cmpd="thickThin" algn="ctr">
+            <a:noFill/>
+            <a:prstDash val="solid"/>
+          </a:ln>
+          <a:effectLst>
+            <a:outerShdw blurRad="31750" dist="10160" dir="10800000" algn="tl" rotWithShape="0">
+              <a:srgbClr val="000000">
+                <a:alpha val="60000"/>
+              </a:srgbClr>
+            </a:outerShdw>
+          </a:effectLst>
+        </p:spPr>
+        <p:style>
+          <a:lnRef idx="2">
+            <a:schemeClr val="accent1"/>
+          </a:lnRef>
+          <a:fillRef idx="1">
+            <a:schemeClr val="accent1"/>
+          </a:fillRef>
+          <a:effectRef idx="0">
+            <a:schemeClr val="accent1"/>
+          </a:effectRef>
+          <a:fontRef idx="minor">
+            <a:schemeClr val="lt1"/>
+          </a:fontRef>
+        </p:style>
+        <p:txBody>
+          <a:bodyPr rtlCol="0" anchor="ctr"/>
+          <a:lstStyle>
+            <a:extLst/>
+          </a:lstStyle>
+          <a:p>
+            <a:pPr algn="ctr" eaLnBrk="1" latinLnBrk="0" hangingPunct="1"/>
+            <a:endParaRPr kumimoji="0" lang="en-US"/>
+          </a:p>
+        </p:txBody>
+      </p:sp>
+      <p:sp>
+        <p:nvSpPr>
+          <p:cNvPr id="8" name="Rectangle 7"/>
+          <p:cNvSpPr/>
+          <p:nvPr/>
+        </p:nvSpPr>
+        <p:spPr bwMode="ltGray">
+          <a:xfrm>
+            <a:off x="6647687" y="0"/>
+            <a:ext cx="2514601" cy="6858000"/>
+          </a:xfrm>
+          <a:prstGeom prst="rect">
+            <a:avLst/>
+          </a:prstGeom>
+          <a:solidFill>
+            <a:srgbClr val="000000"/>
+          </a:solidFill>
+          <a:ln w="48000" cap="flat" cmpd="thickThin" algn="ctr">
+            <a:noFill/>
+            <a:prstDash val="solid"/>
+          </a:ln>
+        </p:spPr>
+        <p:style>
+          <a:lnRef idx="2">
+            <a:schemeClr val="accent1"/>
+          </a:lnRef>
+          <a:fillRef idx="1">
+            <a:schemeClr val="accent1"/>
+          </a:fillRef>
+          <a:effectRef idx="0">
+            <a:schemeClr val="accent1"/>
+          </a:effectRef>
+          <a:fontRef idx="minor">
+            <a:schemeClr val="lt1"/>
+          </a:fontRef>
+        </p:style>
+        <p:txBody>
+          <a:bodyPr rtlCol="0" anchor="ctr"/>
+          <a:lstStyle>
+            <a:extLst/>
+          </a:lstStyle>
+          <a:p>
+            <a:pPr algn="ctr" eaLnBrk="1" latinLnBrk="0" hangingPunct="1"/>
+            <a:endParaRPr kumimoji="0" lang="en-US"/>
+          </a:p>
+        </p:txBody>
+      </p:sp>
+      <p:sp>
+        <p:nvSpPr>
           <p:cNvPr id="2" name="Vertical Title 1"/>
           <p:cNvSpPr>
             <a:spLocks noGrp="1"/>
@@ -546,19 +772,21 @@
         </p:nvSpPr>
         <p:spPr>
           <a:xfrm>
-            <a:off x="6629400" y="274638"/>
-            <a:ext cx="2057400" cy="5851525"/>
+            <a:off x="6781800" y="274640"/>
+            <a:ext cx="1905000" cy="5851525"/>
           </a:xfrm>
         </p:spPr>
         <p:txBody>
           <a:bodyPr vert="eaVert"/>
-          <a:lstStyle/>
-          <a:p>
-            <a:r>
-              <a:rPr lang="en-US" smtClean="0"/>
+          <a:lstStyle>
+            <a:extLst/>
+          </a:lstStyle>
+          <a:p>
+            <a:r>
+              <a:rPr kumimoji="0" lang="en-US" smtClean="0"/>
               <a:t>Click to edit Master title style</a:t>
             </a:r>
-            <a:endParaRPr lang="en-US"/>
+            <a:endParaRPr kumimoji="0" lang="en-US"/>
           </a:p>
         </p:txBody>
       </p:sp>
@@ -574,48 +802,50 @@
         </p:nvSpPr>
         <p:spPr>
           <a:xfrm>
-            <a:off x="457200" y="274638"/>
+            <a:off x="457200" y="304800"/>
             <a:ext cx="6019800" cy="5851525"/>
           </a:xfrm>
         </p:spPr>
         <p:txBody>
           <a:bodyPr vert="eaVert"/>
-          <a:lstStyle/>
-          <a:p>
-            <a:pPr lvl="0"/>
+          <a:lstStyle>
+            <a:extLst/>
+          </a:lstStyle>
+          <a:p>
+            <a:pPr lvl="0" eaLnBrk="1" latinLnBrk="0" hangingPunct="1"/>
             <a:r>
               <a:rPr lang="en-US" smtClean="0"/>
               <a:t>Click to edit Master text styles</a:t>
             </a:r>
           </a:p>
           <a:p>
-            <a:pPr lvl="1"/>
+            <a:pPr lvl="1" eaLnBrk="1" latinLnBrk="0" hangingPunct="1"/>
             <a:r>
               <a:rPr lang="en-US" smtClean="0"/>
               <a:t>Second level</a:t>
             </a:r>
           </a:p>
           <a:p>
-            <a:pPr lvl="2"/>
+            <a:pPr lvl="2" eaLnBrk="1" latinLnBrk="0" hangingPunct="1"/>
             <a:r>
               <a:rPr lang="en-US" smtClean="0"/>
               <a:t>Third level</a:t>
             </a:r>
           </a:p>
           <a:p>
-            <a:pPr lvl="3"/>
+            <a:pPr lvl="3" eaLnBrk="1" latinLnBrk="0" hangingPunct="1"/>
             <a:r>
               <a:rPr lang="en-US" smtClean="0"/>
               <a:t>Fourth level</a:t>
             </a:r>
           </a:p>
           <a:p>
-            <a:pPr lvl="4"/>
+            <a:pPr lvl="4" eaLnBrk="1" latinLnBrk="0" hangingPunct="1"/>
             <a:r>
               <a:rPr lang="en-US" smtClean="0"/>
               <a:t>Fifth level</a:t>
             </a:r>
-            <a:endParaRPr lang="en-US"/>
+            <a:endParaRPr kumimoji="0" lang="en-US"/>
           </a:p>
         </p:txBody>
       </p:sp>
@@ -653,7 +883,12 @@
             <p:ph type="ftr" sz="quarter" idx="11"/>
           </p:nvPr>
         </p:nvSpPr>
-        <p:spPr/>
+        <p:spPr>
+          <a:xfrm>
+            <a:off x="2640597" y="6377459"/>
+            <a:ext cx="3836404" cy="365125"/>
+          </a:xfrm>
+        </p:spPr>
         <p:txBody>
           <a:bodyPr/>
           <a:lstStyle/>
@@ -721,68 +956,77 @@
             <p:ph type="title"/>
           </p:nvPr>
         </p:nvSpPr>
+        <p:spPr>
+          <a:xfrm>
+            <a:off x="457200" y="155448"/>
+            <a:ext cx="8229600" cy="1252728"/>
+          </a:xfrm>
+        </p:spPr>
+        <p:txBody>
+          <a:bodyPr/>
+          <a:lstStyle>
+            <a:extLst/>
+          </a:lstStyle>
+          <a:p>
+            <a:r>
+              <a:rPr kumimoji="0" lang="en-US" smtClean="0"/>
+              <a:t>Click to edit Master title style</a:t>
+            </a:r>
+            <a:endParaRPr kumimoji="0" lang="en-US"/>
+          </a:p>
+        </p:txBody>
+      </p:sp>
+      <p:sp>
+        <p:nvSpPr>
+          <p:cNvPr id="3" name="Content Placeholder 2"/>
+          <p:cNvSpPr>
+            <a:spLocks noGrp="1"/>
+          </p:cNvSpPr>
+          <p:nvPr>
+            <p:ph idx="1"/>
+          </p:nvPr>
+        </p:nvSpPr>
         <p:spPr/>
         <p:txBody>
           <a:bodyPr/>
-          <a:lstStyle/>
-          <a:p>
-            <a:r>
-              <a:rPr lang="en-US" smtClean="0"/>
-              <a:t>Click to edit Master title style</a:t>
-            </a:r>
-            <a:endParaRPr lang="en-US"/>
-          </a:p>
-        </p:txBody>
-      </p:sp>
-      <p:sp>
-        <p:nvSpPr>
-          <p:cNvPr id="3" name="Content Placeholder 2"/>
-          <p:cNvSpPr>
-            <a:spLocks noGrp="1"/>
-          </p:cNvSpPr>
-          <p:nvPr>
-            <p:ph idx="1"/>
-          </p:nvPr>
-        </p:nvSpPr>
-        <p:spPr/>
-        <p:txBody>
-          <a:bodyPr/>
-          <a:lstStyle/>
-          <a:p>
-            <a:pPr lvl="0"/>
+          <a:lstStyle>
+            <a:extLst/>
+          </a:lstStyle>
+          <a:p>
+            <a:pPr lvl="0" eaLnBrk="1" latinLnBrk="0" hangingPunct="1"/>
             <a:r>
               <a:rPr lang="en-US" smtClean="0"/>
               <a:t>Click to edit Master text styles</a:t>
             </a:r>
           </a:p>
           <a:p>
-            <a:pPr lvl="1"/>
+            <a:pPr lvl="1" eaLnBrk="1" latinLnBrk="0" hangingPunct="1"/>
             <a:r>
               <a:rPr lang="en-US" smtClean="0"/>
               <a:t>Second level</a:t>
             </a:r>
           </a:p>
           <a:p>
-            <a:pPr lvl="2"/>
+            <a:pPr lvl="2" eaLnBrk="1" latinLnBrk="0" hangingPunct="1"/>
             <a:r>
               <a:rPr lang="en-US" smtClean="0"/>
               <a:t>Third level</a:t>
             </a:r>
           </a:p>
           <a:p>
-            <a:pPr lvl="3"/>
+            <a:pPr lvl="3" eaLnBrk="1" latinLnBrk="0" hangingPunct="1"/>
             <a:r>
               <a:rPr lang="en-US" smtClean="0"/>
               <a:t>Fourth level</a:t>
             </a:r>
           </a:p>
           <a:p>
-            <a:pPr lvl="4"/>
+            <a:pPr lvl="4" eaLnBrk="1" latinLnBrk="0" hangingPunct="1"/>
             <a:r>
               <a:rPr lang="en-US" smtClean="0"/>
               <a:t>Fifth level</a:t>
             </a:r>
-            <a:endParaRPr lang="en-US"/>
+            <a:endParaRPr kumimoji="0" lang="en-US"/>
           </a:p>
         </p:txBody>
       </p:sp>
@@ -862,8 +1106,13 @@
 </file>
 
 <file path=ppt/slideLayouts/slideLayout3.xml><?xml version="1.0" encoding="utf-8"?>
-<p:sldLayout xmlns:a="http://schemas.openxmlformats.org/drawingml/2006/main" xmlns:r="http://schemas.openxmlformats.org/officeDocument/2006/relationships" xmlns:p="http://schemas.openxmlformats.org/presentationml/2006/main" type="secHead" preserve="1">
+<p:sldLayout xmlns:a="http://schemas.openxmlformats.org/drawingml/2006/main" xmlns:r="http://schemas.openxmlformats.org/officeDocument/2006/relationships" xmlns:p="http://schemas.openxmlformats.org/presentationml/2006/main" showMasterSp="0" type="secHead" preserve="1">
   <p:cSld name="Section Header">
+    <p:bg>
+      <p:bgRef idx="1002">
+        <a:schemeClr val="bg2"/>
+      </p:bgRef>
+    </p:bg>
     <p:spTree>
       <p:nvGrpSpPr>
         <p:cNvPr id="1" name=""/>
@@ -880,6 +1129,107 @@
       </p:grpSpPr>
       <p:sp>
         <p:nvSpPr>
+          <p:cNvPr id="9" name="Rectangle 8"/>
+          <p:cNvSpPr/>
+          <p:nvPr/>
+        </p:nvSpPr>
+        <p:spPr bwMode="ltGray">
+          <a:xfrm>
+            <a:off x="0" y="1"/>
+            <a:ext cx="9144000" cy="2602520"/>
+          </a:xfrm>
+          <a:prstGeom prst="rect">
+            <a:avLst/>
+          </a:prstGeom>
+          <a:solidFill>
+            <a:srgbClr val="000000"/>
+          </a:solidFill>
+          <a:ln w="48000" cap="flat" cmpd="thickThin" algn="ctr">
+            <a:noFill/>
+            <a:prstDash val="solid"/>
+          </a:ln>
+        </p:spPr>
+        <p:style>
+          <a:lnRef idx="2">
+            <a:schemeClr val="accent1"/>
+          </a:lnRef>
+          <a:fillRef idx="1">
+            <a:schemeClr val="accent1"/>
+          </a:fillRef>
+          <a:effectRef idx="0">
+            <a:schemeClr val="accent1"/>
+          </a:effectRef>
+          <a:fontRef idx="minor">
+            <a:schemeClr val="lt1"/>
+          </a:fontRef>
+        </p:style>
+        <p:txBody>
+          <a:bodyPr rtlCol="0" anchor="ctr"/>
+          <a:lstStyle>
+            <a:extLst/>
+          </a:lstStyle>
+          <a:p>
+            <a:pPr algn="ctr" eaLnBrk="1" latinLnBrk="0" hangingPunct="1"/>
+            <a:endParaRPr kumimoji="0" lang="en-US"/>
+          </a:p>
+        </p:txBody>
+      </p:sp>
+      <p:sp>
+        <p:nvSpPr>
+          <p:cNvPr id="12" name="Rectangle 11"/>
+          <p:cNvSpPr/>
+          <p:nvPr/>
+        </p:nvSpPr>
+        <p:spPr bwMode="invGray">
+          <a:xfrm>
+            <a:off x="0" y="2602520"/>
+            <a:ext cx="9144000" cy="45720"/>
+          </a:xfrm>
+          <a:prstGeom prst="rect">
+            <a:avLst/>
+          </a:prstGeom>
+          <a:solidFill>
+            <a:srgbClr val="FFFFFF"/>
+          </a:solidFill>
+          <a:ln w="48000" cap="flat" cmpd="thickThin" algn="ctr">
+            <a:noFill/>
+            <a:prstDash val="solid"/>
+          </a:ln>
+          <a:effectLst>
+            <a:outerShdw blurRad="31750" dist="10160" dir="5400000" algn="tl" rotWithShape="0">
+              <a:srgbClr val="000000">
+                <a:alpha val="60000"/>
+              </a:srgbClr>
+            </a:outerShdw>
+          </a:effectLst>
+        </p:spPr>
+        <p:style>
+          <a:lnRef idx="2">
+            <a:schemeClr val="accent1"/>
+          </a:lnRef>
+          <a:fillRef idx="1">
+            <a:schemeClr val="accent1"/>
+          </a:fillRef>
+          <a:effectRef idx="0">
+            <a:schemeClr val="accent1"/>
+          </a:effectRef>
+          <a:fontRef idx="minor">
+            <a:schemeClr val="lt1"/>
+          </a:fontRef>
+        </p:style>
+        <p:txBody>
+          <a:bodyPr rtlCol="0" anchor="ctr"/>
+          <a:lstStyle>
+            <a:extLst/>
+          </a:lstStyle>
+          <a:p>
+            <a:pPr algn="ctr" eaLnBrk="1" latinLnBrk="0" hangingPunct="1"/>
+            <a:endParaRPr kumimoji="0" lang="en-US"/>
+          </a:p>
+        </p:txBody>
+      </p:sp>
+      <p:sp>
+        <p:nvSpPr>
           <p:cNvPr id="2" name="Title 1"/>
           <p:cNvSpPr>
             <a:spLocks noGrp="1"/>
@@ -890,23 +1240,35 @@
         </p:nvSpPr>
         <p:spPr>
           <a:xfrm>
-            <a:off x="722313" y="4406900"/>
-            <a:ext cx="7772400" cy="1362075"/>
+            <a:off x="749808" y="118872"/>
+            <a:ext cx="8013192" cy="1636776"/>
           </a:xfrm>
         </p:spPr>
         <p:txBody>
-          <a:bodyPr anchor="t"/>
+          <a:bodyPr vert="horz" lIns="91440" tIns="0" rIns="91440" bIns="0" rtlCol="0" anchor="b">
+            <a:normAutofit/>
+            <a:scene3d>
+              <a:camera prst="orthographicFront"/>
+              <a:lightRig rig="threePt" dir="t">
+                <a:rot lat="0" lon="0" rev="4800000"/>
+              </a:lightRig>
+            </a:scene3d>
+            <a:sp3d prstMaterial="matte">
+              <a:bevelT w="50800" h="10160"/>
+            </a:sp3d>
+          </a:bodyPr>
           <a:lstStyle>
             <a:lvl1pPr algn="l">
-              <a:defRPr sz="4000" b="1" cap="all"/>
+              <a:defRPr sz="4700" b="1" cap="none" baseline="0"/>
             </a:lvl1pPr>
+            <a:extLst/>
           </a:lstStyle>
           <a:p>
             <a:r>
-              <a:rPr lang="en-US" smtClean="0"/>
+              <a:rPr kumimoji="0" lang="en-US" smtClean="0"/>
               <a:t>Click to edit Master title style</a:t>
             </a:r>
-            <a:endParaRPr lang="en-US"/>
+            <a:endParaRPr kumimoji="0" lang="en-US"/>
           </a:p>
         </p:txBody>
       </p:sp>
@@ -922,20 +1284,18 @@
         </p:nvSpPr>
         <p:spPr>
           <a:xfrm>
-            <a:off x="722313" y="2906713"/>
-            <a:ext cx="7772400" cy="1500187"/>
+            <a:off x="740664" y="1828800"/>
+            <a:ext cx="8022336" cy="685800"/>
           </a:xfrm>
         </p:spPr>
         <p:txBody>
-          <a:bodyPr anchor="b"/>
+          <a:bodyPr lIns="146304" tIns="0" rIns="45720" bIns="0" anchor="t"/>
           <a:lstStyle>
             <a:lvl1pPr marL="0" indent="0">
               <a:buNone/>
               <a:defRPr sz="2000">
                 <a:solidFill>
-                  <a:schemeClr val="tx1">
-                    <a:tint val="75000"/>
-                  </a:schemeClr>
+                  <a:srgbClr val="FFFFFF"/>
                 </a:solidFill>
               </a:defRPr>
             </a:lvl1pPr>
@@ -1019,11 +1379,12 @@
                 </a:solidFill>
               </a:defRPr>
             </a:lvl9pPr>
+            <a:extLst/>
           </a:lstStyle>
           <a:p>
-            <a:pPr lvl="0"/>
-            <a:r>
-              <a:rPr lang="en-US" smtClean="0"/>
+            <a:pPr lvl="0" eaLnBrk="1" latinLnBrk="0" hangingPunct="1"/>
+            <a:r>
+              <a:rPr kumimoji="0" lang="en-US" smtClean="0"/>
               <a:t>Click to edit Master text styles</a:t>
             </a:r>
           </a:p>
@@ -1099,7 +1460,7 @@
     </p:spTree>
   </p:cSld>
   <p:clrMapOvr>
-    <a:masterClrMapping/>
+    <a:overrideClrMapping bg1="dk1" tx1="lt1" bg2="dk2" tx2="lt2" accent1="accent1" accent2="accent2" accent3="accent3" accent4="accent4" accent5="accent5" accent6="accent6" hlink="hlink" folHlink="folHlink"/>
   </p:clrMapOvr>
 </p:sldLayout>
 </file>
@@ -1134,13 +1495,15 @@
         <p:spPr/>
         <p:txBody>
           <a:bodyPr/>
-          <a:lstStyle/>
-          <a:p>
-            <a:r>
-              <a:rPr lang="en-US" smtClean="0"/>
+          <a:lstStyle>
+            <a:extLst/>
+          </a:lstStyle>
+          <a:p>
+            <a:r>
+              <a:rPr kumimoji="0" lang="en-US" smtClean="0"/>
               <a:t>Click to edit Master title style</a:t>
             </a:r>
-            <a:endParaRPr lang="en-US"/>
+            <a:endParaRPr kumimoji="0" lang="en-US"/>
           </a:p>
         </p:txBody>
       </p:sp>
@@ -1156,12 +1519,12 @@
         </p:nvSpPr>
         <p:spPr>
           <a:xfrm>
-            <a:off x="457200" y="1600200"/>
-            <a:ext cx="4038600" cy="4525963"/>
+            <a:off x="457200" y="1773936"/>
+            <a:ext cx="4038600" cy="4623816"/>
           </a:xfrm>
         </p:spPr>
         <p:txBody>
-          <a:bodyPr/>
+          <a:bodyPr lIns="91440"/>
           <a:lstStyle>
             <a:lvl1pPr>
               <a:defRPr sz="2800"/>
@@ -1190,42 +1553,43 @@
             <a:lvl9pPr>
               <a:defRPr sz="1800"/>
             </a:lvl9pPr>
+            <a:extLst/>
           </a:lstStyle>
           <a:p>
-            <a:pPr lvl="0"/>
+            <a:pPr lvl="0" eaLnBrk="1" latinLnBrk="0" hangingPunct="1"/>
             <a:r>
               <a:rPr lang="en-US" smtClean="0"/>
               <a:t>Click to edit Master text styles</a:t>
             </a:r>
           </a:p>
           <a:p>
-            <a:pPr lvl="1"/>
+            <a:pPr lvl="1" eaLnBrk="1" latinLnBrk="0" hangingPunct="1"/>
             <a:r>
               <a:rPr lang="en-US" smtClean="0"/>
               <a:t>Second level</a:t>
             </a:r>
           </a:p>
           <a:p>
-            <a:pPr lvl="2"/>
+            <a:pPr lvl="2" eaLnBrk="1" latinLnBrk="0" hangingPunct="1"/>
             <a:r>
               <a:rPr lang="en-US" smtClean="0"/>
               <a:t>Third level</a:t>
             </a:r>
           </a:p>
           <a:p>
-            <a:pPr lvl="3"/>
+            <a:pPr lvl="3" eaLnBrk="1" latinLnBrk="0" hangingPunct="1"/>
             <a:r>
               <a:rPr lang="en-US" smtClean="0"/>
               <a:t>Fourth level</a:t>
             </a:r>
           </a:p>
           <a:p>
-            <a:pPr lvl="4"/>
+            <a:pPr lvl="4" eaLnBrk="1" latinLnBrk="0" hangingPunct="1"/>
             <a:r>
               <a:rPr lang="en-US" smtClean="0"/>
               <a:t>Fifth level</a:t>
             </a:r>
-            <a:endParaRPr lang="en-US"/>
+            <a:endParaRPr kumimoji="0" lang="en-US"/>
           </a:p>
         </p:txBody>
       </p:sp>
@@ -1241,8 +1605,8 @@
         </p:nvSpPr>
         <p:spPr>
           <a:xfrm>
-            <a:off x="4648200" y="1600200"/>
-            <a:ext cx="4038600" cy="4525963"/>
+            <a:off x="4648200" y="1773936"/>
+            <a:ext cx="4038600" cy="4623816"/>
           </a:xfrm>
         </p:spPr>
         <p:txBody>
@@ -1275,42 +1639,43 @@
             <a:lvl9pPr>
               <a:defRPr sz="1800"/>
             </a:lvl9pPr>
+            <a:extLst/>
           </a:lstStyle>
           <a:p>
-            <a:pPr lvl="0"/>
+            <a:pPr lvl="0" eaLnBrk="1" latinLnBrk="0" hangingPunct="1"/>
             <a:r>
               <a:rPr lang="en-US" smtClean="0"/>
               <a:t>Click to edit Master text styles</a:t>
             </a:r>
           </a:p>
           <a:p>
-            <a:pPr lvl="1"/>
+            <a:pPr lvl="1" eaLnBrk="1" latinLnBrk="0" hangingPunct="1"/>
             <a:r>
               <a:rPr lang="en-US" smtClean="0"/>
               <a:t>Second level</a:t>
             </a:r>
           </a:p>
           <a:p>
-            <a:pPr lvl="2"/>
+            <a:pPr lvl="2" eaLnBrk="1" latinLnBrk="0" hangingPunct="1"/>
             <a:r>
               <a:rPr lang="en-US" smtClean="0"/>
               <a:t>Third level</a:t>
             </a:r>
           </a:p>
           <a:p>
-            <a:pPr lvl="3"/>
+            <a:pPr lvl="3" eaLnBrk="1" latinLnBrk="0" hangingPunct="1"/>
             <a:r>
               <a:rPr lang="en-US" smtClean="0"/>
               <a:t>Fourth level</a:t>
             </a:r>
           </a:p>
           <a:p>
-            <a:pPr lvl="4"/>
+            <a:pPr lvl="4" eaLnBrk="1" latinLnBrk="0" hangingPunct="1"/>
             <a:r>
               <a:rPr lang="en-US" smtClean="0"/>
               <a:t>Fifth level</a:t>
             </a:r>
-            <a:endParaRPr lang="en-US"/>
+            <a:endParaRPr kumimoji="0" lang="en-US"/>
           </a:p>
         </p:txBody>
       </p:sp>
@@ -1423,13 +1788,14 @@
             <a:lvl1pPr>
               <a:defRPr/>
             </a:lvl1pPr>
+            <a:extLst/>
           </a:lstStyle>
           <a:p>
             <a:r>
-              <a:rPr lang="en-US" smtClean="0"/>
+              <a:rPr kumimoji="0" lang="en-US" smtClean="0"/>
               <a:t>Click to edit Master title style</a:t>
             </a:r>
-            <a:endParaRPr lang="en-US"/>
+            <a:endParaRPr kumimoji="0" lang="en-US"/>
           </a:p>
         </p:txBody>
       </p:sp>
@@ -1445,16 +1811,16 @@
         </p:nvSpPr>
         <p:spPr>
           <a:xfrm>
-            <a:off x="457200" y="1535113"/>
-            <a:ext cx="4040188" cy="639762"/>
+            <a:off x="457200" y="1698987"/>
+            <a:ext cx="4040188" cy="715355"/>
           </a:xfrm>
         </p:spPr>
         <p:txBody>
-          <a:bodyPr anchor="b"/>
+          <a:bodyPr lIns="146304" anchor="ctr"/>
           <a:lstStyle>
             <a:lvl1pPr marL="0" indent="0">
               <a:buNone/>
-              <a:defRPr sz="2400" b="1"/>
+              <a:defRPr sz="2300" b="1" cap="all" baseline="0"/>
             </a:lvl1pPr>
             <a:lvl2pPr marL="457200" indent="0">
               <a:buNone/>
@@ -1488,11 +1854,12 @@
               <a:buNone/>
               <a:defRPr sz="1600" b="1"/>
             </a:lvl9pPr>
+            <a:extLst/>
           </a:lstStyle>
           <a:p>
-            <a:pPr lvl="0"/>
-            <a:r>
-              <a:rPr lang="en-US" smtClean="0"/>
+            <a:pPr lvl="0" eaLnBrk="1" latinLnBrk="0" hangingPunct="1"/>
+            <a:r>
+              <a:rPr kumimoji="0" lang="en-US" smtClean="0"/>
               <a:t>Click to edit Master text styles</a:t>
             </a:r>
           </a:p>
@@ -1510,7 +1877,7 @@
         </p:nvSpPr>
         <p:spPr>
           <a:xfrm>
-            <a:off x="457200" y="2174875"/>
+            <a:off x="457200" y="2449512"/>
             <a:ext cx="4040188" cy="3951288"/>
           </a:xfrm>
         </p:spPr>
@@ -1544,42 +1911,43 @@
             <a:lvl9pPr>
               <a:defRPr sz="1600"/>
             </a:lvl9pPr>
+            <a:extLst/>
           </a:lstStyle>
           <a:p>
-            <a:pPr lvl="0"/>
+            <a:pPr lvl="0" eaLnBrk="1" latinLnBrk="0" hangingPunct="1"/>
             <a:r>
               <a:rPr lang="en-US" smtClean="0"/>
               <a:t>Click to edit Master text styles</a:t>
             </a:r>
           </a:p>
           <a:p>
-            <a:pPr lvl="1"/>
+            <a:pPr lvl="1" eaLnBrk="1" latinLnBrk="0" hangingPunct="1"/>
             <a:r>
               <a:rPr lang="en-US" smtClean="0"/>
               <a:t>Second level</a:t>
             </a:r>
           </a:p>
           <a:p>
-            <a:pPr lvl="2"/>
+            <a:pPr lvl="2" eaLnBrk="1" latinLnBrk="0" hangingPunct="1"/>
             <a:r>
               <a:rPr lang="en-US" smtClean="0"/>
               <a:t>Third level</a:t>
             </a:r>
           </a:p>
           <a:p>
-            <a:pPr lvl="3"/>
+            <a:pPr lvl="3" eaLnBrk="1" latinLnBrk="0" hangingPunct="1"/>
             <a:r>
               <a:rPr lang="en-US" smtClean="0"/>
               <a:t>Fourth level</a:t>
             </a:r>
           </a:p>
           <a:p>
-            <a:pPr lvl="4"/>
+            <a:pPr lvl="4" eaLnBrk="1" latinLnBrk="0" hangingPunct="1"/>
             <a:r>
               <a:rPr lang="en-US" smtClean="0"/>
               <a:t>Fifth level</a:t>
             </a:r>
-            <a:endParaRPr lang="en-US"/>
+            <a:endParaRPr kumimoji="0" lang="en-US"/>
           </a:p>
         </p:txBody>
       </p:sp>
@@ -1595,16 +1963,16 @@
         </p:nvSpPr>
         <p:spPr>
           <a:xfrm>
-            <a:off x="4645025" y="1535113"/>
-            <a:ext cx="4041775" cy="639762"/>
+            <a:off x="4645025" y="1698987"/>
+            <a:ext cx="4041775" cy="715355"/>
           </a:xfrm>
         </p:spPr>
         <p:txBody>
-          <a:bodyPr anchor="b"/>
+          <a:bodyPr lIns="146304" anchor="ctr"/>
           <a:lstStyle>
             <a:lvl1pPr marL="0" indent="0">
               <a:buNone/>
-              <a:defRPr sz="2400" b="1"/>
+              <a:defRPr sz="2300" b="1" cap="all" baseline="0"/>
             </a:lvl1pPr>
             <a:lvl2pPr marL="457200" indent="0">
               <a:buNone/>
@@ -1638,11 +2006,12 @@
               <a:buNone/>
               <a:defRPr sz="1600" b="1"/>
             </a:lvl9pPr>
+            <a:extLst/>
           </a:lstStyle>
           <a:p>
-            <a:pPr lvl="0"/>
-            <a:r>
-              <a:rPr lang="en-US" smtClean="0"/>
+            <a:pPr lvl="0" eaLnBrk="1" latinLnBrk="0" hangingPunct="1"/>
+            <a:r>
+              <a:rPr kumimoji="0" lang="en-US" smtClean="0"/>
               <a:t>Click to edit Master text styles</a:t>
             </a:r>
           </a:p>
@@ -1660,7 +2029,7 @@
         </p:nvSpPr>
         <p:spPr>
           <a:xfrm>
-            <a:off x="4645025" y="2174875"/>
+            <a:off x="4645025" y="2449512"/>
             <a:ext cx="4041775" cy="3951288"/>
           </a:xfrm>
         </p:spPr>
@@ -1694,42 +2063,43 @@
             <a:lvl9pPr>
               <a:defRPr sz="1600"/>
             </a:lvl9pPr>
+            <a:extLst/>
           </a:lstStyle>
           <a:p>
-            <a:pPr lvl="0"/>
+            <a:pPr lvl="0" eaLnBrk="1" latinLnBrk="0" hangingPunct="1"/>
             <a:r>
               <a:rPr lang="en-US" smtClean="0"/>
               <a:t>Click to edit Master text styles</a:t>
             </a:r>
           </a:p>
           <a:p>
-            <a:pPr lvl="1"/>
+            <a:pPr lvl="1" eaLnBrk="1" latinLnBrk="0" hangingPunct="1"/>
             <a:r>
               <a:rPr lang="en-US" smtClean="0"/>
               <a:t>Second level</a:t>
             </a:r>
           </a:p>
           <a:p>
-            <a:pPr lvl="2"/>
+            <a:pPr lvl="2" eaLnBrk="1" latinLnBrk="0" hangingPunct="1"/>
             <a:r>
               <a:rPr lang="en-US" smtClean="0"/>
               <a:t>Third level</a:t>
             </a:r>
           </a:p>
           <a:p>
-            <a:pPr lvl="3"/>
+            <a:pPr lvl="3" eaLnBrk="1" latinLnBrk="0" hangingPunct="1"/>
             <a:r>
               <a:rPr lang="en-US" smtClean="0"/>
               <a:t>Fourth level</a:t>
             </a:r>
           </a:p>
           <a:p>
-            <a:pPr lvl="4"/>
+            <a:pPr lvl="4" eaLnBrk="1" latinLnBrk="0" hangingPunct="1"/>
             <a:r>
               <a:rPr lang="en-US" smtClean="0"/>
               <a:t>Fifth level</a:t>
             </a:r>
-            <a:endParaRPr lang="en-US"/>
+            <a:endParaRPr kumimoji="0" lang="en-US"/>
           </a:p>
         </p:txBody>
       </p:sp>
@@ -1838,13 +2208,15 @@
         <p:spPr/>
         <p:txBody>
           <a:bodyPr/>
-          <a:lstStyle/>
-          <a:p>
-            <a:r>
-              <a:rPr lang="en-US" smtClean="0"/>
+          <a:lstStyle>
+            <a:extLst/>
+          </a:lstStyle>
+          <a:p>
+            <a:r>
+              <a:rPr kumimoji="0" lang="en-US" smtClean="0"/>
               <a:t>Click to edit Master title style</a:t>
             </a:r>
-            <a:endParaRPr lang="en-US"/>
+            <a:endParaRPr kumimoji="0" lang="en-US"/>
           </a:p>
         </p:txBody>
       </p:sp>
@@ -1924,7 +2296,7 @@
 </file>
 
 <file path=ppt/slideLayouts/slideLayout7.xml><?xml version="1.0" encoding="utf-8"?>
-<p:sldLayout xmlns:a="http://schemas.openxmlformats.org/drawingml/2006/main" xmlns:r="http://schemas.openxmlformats.org/officeDocument/2006/relationships" xmlns:p="http://schemas.openxmlformats.org/presentationml/2006/main" type="blank" preserve="1">
+<p:sldLayout xmlns:a="http://schemas.openxmlformats.org/drawingml/2006/main" xmlns:r="http://schemas.openxmlformats.org/officeDocument/2006/relationships" xmlns:p="http://schemas.openxmlformats.org/presentationml/2006/main" showMasterSp="0" type="blank" preserve="1">
   <p:cSld name="Blank">
     <p:spTree>
       <p:nvGrpSpPr>
@@ -2044,23 +2416,27 @@
         </p:nvSpPr>
         <p:spPr>
           <a:xfrm>
-            <a:off x="457200" y="273050"/>
-            <a:ext cx="3008313" cy="1162050"/>
+            <a:off x="167838" y="152400"/>
+            <a:ext cx="2523744" cy="978408"/>
           </a:xfrm>
         </p:spPr>
         <p:txBody>
-          <a:bodyPr anchor="b"/>
+          <a:bodyPr vert="horz" lIns="73152" rIns="45720" bIns="0" rtlCol="0" anchor="b">
+            <a:normAutofit/>
+            <a:sp3d prstMaterial="matte"/>
+          </a:bodyPr>
           <a:lstStyle>
             <a:lvl1pPr algn="l">
-              <a:defRPr sz="2000" b="1"/>
+              <a:defRPr sz="2000" b="0"/>
             </a:lvl1pPr>
+            <a:extLst/>
           </a:lstStyle>
           <a:p>
             <a:r>
-              <a:rPr lang="en-US" smtClean="0"/>
+              <a:rPr kumimoji="0" lang="en-US" smtClean="0"/>
               <a:t>Click to edit Master title style</a:t>
             </a:r>
-            <a:endParaRPr lang="en-US"/>
+            <a:endParaRPr kumimoji="0" lang="en-US"/>
           </a:p>
         </p:txBody>
       </p:sp>
@@ -2076,8 +2452,8 @@
         </p:nvSpPr>
         <p:spPr>
           <a:xfrm>
-            <a:off x="3575050" y="273050"/>
-            <a:ext cx="5111750" cy="5853113"/>
+            <a:off x="3019377" y="1743133"/>
+            <a:ext cx="5920641" cy="4558885"/>
           </a:xfrm>
         </p:spPr>
         <p:txBody>
@@ -2110,42 +2486,43 @@
             <a:lvl9pPr>
               <a:defRPr sz="2000"/>
             </a:lvl9pPr>
+            <a:extLst/>
           </a:lstStyle>
           <a:p>
-            <a:pPr lvl="0"/>
+            <a:pPr lvl="0" eaLnBrk="1" latinLnBrk="0" hangingPunct="1"/>
             <a:r>
               <a:rPr lang="en-US" smtClean="0"/>
               <a:t>Click to edit Master text styles</a:t>
             </a:r>
           </a:p>
           <a:p>
-            <a:pPr lvl="1"/>
+            <a:pPr lvl="1" eaLnBrk="1" latinLnBrk="0" hangingPunct="1"/>
             <a:r>
               <a:rPr lang="en-US" smtClean="0"/>
               <a:t>Second level</a:t>
             </a:r>
           </a:p>
           <a:p>
-            <a:pPr lvl="2"/>
+            <a:pPr lvl="2" eaLnBrk="1" latinLnBrk="0" hangingPunct="1"/>
             <a:r>
               <a:rPr lang="en-US" smtClean="0"/>
               <a:t>Third level</a:t>
             </a:r>
           </a:p>
           <a:p>
-            <a:pPr lvl="3"/>
+            <a:pPr lvl="3" eaLnBrk="1" latinLnBrk="0" hangingPunct="1"/>
             <a:r>
               <a:rPr lang="en-US" smtClean="0"/>
               <a:t>Fourth level</a:t>
             </a:r>
           </a:p>
           <a:p>
-            <a:pPr lvl="4"/>
+            <a:pPr lvl="4" eaLnBrk="1" latinLnBrk="0" hangingPunct="1"/>
             <a:r>
               <a:rPr lang="en-US" smtClean="0"/>
               <a:t>Fifth level</a:t>
             </a:r>
-            <a:endParaRPr lang="en-US"/>
+            <a:endParaRPr kumimoji="0" lang="en-US"/>
           </a:p>
         </p:txBody>
       </p:sp>
@@ -2161,8 +2538,8 @@
         </p:nvSpPr>
         <p:spPr>
           <a:xfrm>
-            <a:off x="457200" y="1435100"/>
-            <a:ext cx="3008313" cy="4691063"/>
+            <a:off x="167838" y="1730018"/>
+            <a:ext cx="2468880" cy="4572000"/>
           </a:xfrm>
         </p:spPr>
         <p:txBody>
@@ -2204,11 +2581,12 @@
               <a:buNone/>
               <a:defRPr sz="900"/>
             </a:lvl9pPr>
+            <a:extLst/>
           </a:lstStyle>
           <a:p>
-            <a:pPr lvl="0"/>
-            <a:r>
-              <a:rPr lang="en-US" smtClean="0"/>
+            <a:pPr lvl="0" eaLnBrk="1" latinLnBrk="0" hangingPunct="1"/>
+            <a:r>
+              <a:rPr kumimoji="0" lang="en-US" smtClean="0"/>
               <a:t>Click to edit Master text styles</a:t>
             </a:r>
           </a:p>
@@ -2278,6 +2656,100 @@
               <a:t>‹#›</a:t>
             </a:fld>
             <a:endParaRPr lang="en-US"/>
+          </a:p>
+        </p:txBody>
+      </p:sp>
+      <p:sp>
+        <p:nvSpPr>
+          <p:cNvPr id="12" name="Rectangle 11"/>
+          <p:cNvSpPr/>
+          <p:nvPr/>
+        </p:nvSpPr>
+        <p:spPr bwMode="invGray">
+          <a:xfrm>
+            <a:off x="2855737" y="0"/>
+            <a:ext cx="45720" cy="1453896"/>
+          </a:xfrm>
+          <a:prstGeom prst="rect">
+            <a:avLst/>
+          </a:prstGeom>
+          <a:solidFill>
+            <a:srgbClr val="FFFFFF"/>
+          </a:solidFill>
+          <a:ln w="48000" cap="flat" cmpd="thickThin" algn="ctr">
+            <a:noFill/>
+            <a:prstDash val="solid"/>
+          </a:ln>
+        </p:spPr>
+        <p:style>
+          <a:lnRef idx="2">
+            <a:schemeClr val="accent1"/>
+          </a:lnRef>
+          <a:fillRef idx="1">
+            <a:schemeClr val="accent1"/>
+          </a:fillRef>
+          <a:effectRef idx="0">
+            <a:schemeClr val="accent1"/>
+          </a:effectRef>
+          <a:fontRef idx="minor">
+            <a:schemeClr val="lt1"/>
+          </a:fontRef>
+        </p:style>
+        <p:txBody>
+          <a:bodyPr rtlCol="0" anchor="ctr"/>
+          <a:lstStyle>
+            <a:extLst/>
+          </a:lstStyle>
+          <a:p>
+            <a:pPr algn="ctr" eaLnBrk="1" latinLnBrk="0" hangingPunct="1"/>
+            <a:endParaRPr kumimoji="0" lang="en-US"/>
+          </a:p>
+        </p:txBody>
+      </p:sp>
+      <p:sp>
+        <p:nvSpPr>
+          <p:cNvPr id="9" name="Rectangle 8"/>
+          <p:cNvSpPr/>
+          <p:nvPr/>
+        </p:nvSpPr>
+        <p:spPr bwMode="invGray">
+          <a:xfrm>
+            <a:off x="2855737" y="0"/>
+            <a:ext cx="45720" cy="1453896"/>
+          </a:xfrm>
+          <a:prstGeom prst="rect">
+            <a:avLst/>
+          </a:prstGeom>
+          <a:solidFill>
+            <a:srgbClr val="FFFFFF"/>
+          </a:solidFill>
+          <a:ln w="48000" cap="flat" cmpd="thickThin" algn="ctr">
+            <a:noFill/>
+            <a:prstDash val="solid"/>
+          </a:ln>
+        </p:spPr>
+        <p:style>
+          <a:lnRef idx="2">
+            <a:schemeClr val="accent1"/>
+          </a:lnRef>
+          <a:fillRef idx="1">
+            <a:schemeClr val="accent1"/>
+          </a:fillRef>
+          <a:effectRef idx="0">
+            <a:schemeClr val="accent1"/>
+          </a:effectRef>
+          <a:fontRef idx="minor">
+            <a:schemeClr val="lt1"/>
+          </a:fontRef>
+        </p:style>
+        <p:txBody>
+          <a:bodyPr rtlCol="0" anchor="ctr"/>
+          <a:lstStyle>
+            <a:extLst/>
+          </a:lstStyle>
+          <a:p>
+            <a:pPr algn="ctr" eaLnBrk="1" latinLnBrk="0" hangingPunct="1"/>
+            <a:endParaRPr kumimoji="0" lang="en-US"/>
           </a:p>
         </p:txBody>
       </p:sp>
@@ -2292,6 +2764,11 @@
 <file path=ppt/slideLayouts/slideLayout9.xml><?xml version="1.0" encoding="utf-8"?>
 <p:sldLayout xmlns:a="http://schemas.openxmlformats.org/drawingml/2006/main" xmlns:r="http://schemas.openxmlformats.org/officeDocument/2006/relationships" xmlns:p="http://schemas.openxmlformats.org/presentationml/2006/main" type="picTx" preserve="1">
   <p:cSld name="Picture with Caption">
+    <p:bg>
+      <p:bgRef idx="1001">
+        <a:schemeClr val="bg2"/>
+      </p:bgRef>
+    </p:bg>
     <p:spTree>
       <p:nvGrpSpPr>
         <p:cNvPr id="1" name=""/>
@@ -2318,23 +2795,26 @@
         </p:nvSpPr>
         <p:spPr>
           <a:xfrm>
-            <a:off x="1792288" y="4800600"/>
-            <a:ext cx="5486400" cy="566738"/>
+            <a:off x="164592" y="155448"/>
+            <a:ext cx="2525150" cy="978408"/>
           </a:xfrm>
         </p:spPr>
         <p:txBody>
-          <a:bodyPr anchor="b"/>
+          <a:bodyPr lIns="73152" bIns="0" anchor="b">
+            <a:sp3d prstMaterial="matte"/>
+          </a:bodyPr>
           <a:lstStyle>
             <a:lvl1pPr algn="l">
-              <a:defRPr sz="2000" b="1"/>
+              <a:defRPr sz="2000" b="0"/>
             </a:lvl1pPr>
+            <a:extLst/>
           </a:lstStyle>
           <a:p>
             <a:r>
-              <a:rPr lang="en-US" smtClean="0"/>
+              <a:rPr kumimoji="0" lang="en-US" smtClean="0"/>
               <a:t>Click to edit Master title style</a:t>
             </a:r>
-            <a:endParaRPr lang="en-US"/>
+            <a:endParaRPr kumimoji="0" lang="en-US"/>
           </a:p>
         </p:txBody>
       </p:sp>
@@ -2350,9 +2830,14 @@
         </p:nvSpPr>
         <p:spPr>
           <a:xfrm>
-            <a:off x="1792288" y="612775"/>
-            <a:ext cx="5486400" cy="4114800"/>
+            <a:off x="2903805" y="1484808"/>
+            <a:ext cx="6247397" cy="5373192"/>
           </a:xfrm>
+          <a:solidFill>
+            <a:schemeClr val="bg2">
+              <a:shade val="75000"/>
+            </a:schemeClr>
+          </a:solidFill>
         </p:spPr>
         <p:txBody>
           <a:bodyPr/>
@@ -2393,9 +2878,14 @@
               <a:buNone/>
               <a:defRPr sz="2000"/>
             </a:lvl9pPr>
+            <a:extLst/>
           </a:lstStyle>
           <a:p>
-            <a:endParaRPr lang="en-US"/>
+            <a:r>
+              <a:rPr kumimoji="0" lang="en-US" smtClean="0"/>
+              <a:t>Click icon to add picture</a:t>
+            </a:r>
+            <a:endParaRPr kumimoji="0" lang="en-US" dirty="0"/>
           </a:p>
         </p:txBody>
       </p:sp>
@@ -2411,8 +2901,8 @@
         </p:nvSpPr>
         <p:spPr>
           <a:xfrm>
-            <a:off x="1792288" y="5367338"/>
-            <a:ext cx="5486400" cy="804862"/>
+            <a:off x="164592" y="1728216"/>
+            <a:ext cx="2468880" cy="4572000"/>
           </a:xfrm>
         </p:spPr>
         <p:txBody>
@@ -2454,11 +2944,12 @@
               <a:buNone/>
               <a:defRPr sz="900"/>
             </a:lvl9pPr>
+            <a:extLst/>
           </a:lstStyle>
           <a:p>
-            <a:pPr lvl="0"/>
-            <a:r>
-              <a:rPr lang="en-US" smtClean="0"/>
+            <a:pPr lvl="0" eaLnBrk="1" latinLnBrk="0" hangingPunct="1"/>
+            <a:r>
+              <a:rPr kumimoji="0" lang="en-US" smtClean="0"/>
               <a:t>Click to edit Master text styles</a:t>
             </a:r>
           </a:p>
@@ -2474,7 +2965,12 @@
             <p:ph type="dt" sz="half" idx="10"/>
           </p:nvPr>
         </p:nvSpPr>
-        <p:spPr/>
+        <p:spPr>
+          <a:xfrm>
+            <a:off x="164592" y="1170432"/>
+            <a:ext cx="2523744" cy="201168"/>
+          </a:xfrm>
+        </p:spPr>
         <p:txBody>
           <a:bodyPr/>
           <a:lstStyle/>
@@ -2490,6 +2986,100 @@
       </p:sp>
       <p:sp>
         <p:nvSpPr>
+          <p:cNvPr id="11" name="Rectangle 10"/>
+          <p:cNvSpPr/>
+          <p:nvPr/>
+        </p:nvSpPr>
+        <p:spPr>
+          <a:xfrm>
+            <a:off x="2855737" y="0"/>
+            <a:ext cx="45720" cy="6858000"/>
+          </a:xfrm>
+          <a:prstGeom prst="rect">
+            <a:avLst/>
+          </a:prstGeom>
+          <a:solidFill>
+            <a:srgbClr val="FFFFFF"/>
+          </a:solidFill>
+          <a:ln w="48000" cap="flat" cmpd="thickThin" algn="ctr">
+            <a:noFill/>
+            <a:prstDash val="solid"/>
+          </a:ln>
+        </p:spPr>
+        <p:style>
+          <a:lnRef idx="2">
+            <a:schemeClr val="accent1"/>
+          </a:lnRef>
+          <a:fillRef idx="1">
+            <a:schemeClr val="accent1"/>
+          </a:fillRef>
+          <a:effectRef idx="0">
+            <a:schemeClr val="accent1"/>
+          </a:effectRef>
+          <a:fontRef idx="minor">
+            <a:schemeClr val="lt1"/>
+          </a:fontRef>
+        </p:style>
+        <p:txBody>
+          <a:bodyPr rtlCol="0" anchor="ctr"/>
+          <a:lstStyle>
+            <a:extLst/>
+          </a:lstStyle>
+          <a:p>
+            <a:pPr algn="ctr" eaLnBrk="1" latinLnBrk="0" hangingPunct="1"/>
+            <a:endParaRPr kumimoji="0" lang="en-US"/>
+          </a:p>
+        </p:txBody>
+      </p:sp>
+      <p:sp>
+        <p:nvSpPr>
+          <p:cNvPr id="9" name="Rectangle 8"/>
+          <p:cNvSpPr/>
+          <p:nvPr/>
+        </p:nvSpPr>
+        <p:spPr bwMode="invGray">
+          <a:xfrm>
+            <a:off x="2855737" y="0"/>
+            <a:ext cx="45720" cy="6858000"/>
+          </a:xfrm>
+          <a:prstGeom prst="rect">
+            <a:avLst/>
+          </a:prstGeom>
+          <a:solidFill>
+            <a:srgbClr val="FFFFFF"/>
+          </a:solidFill>
+          <a:ln w="48000" cap="flat" cmpd="thickThin" algn="ctr">
+            <a:noFill/>
+            <a:prstDash val="solid"/>
+          </a:ln>
+        </p:spPr>
+        <p:style>
+          <a:lnRef idx="2">
+            <a:schemeClr val="accent1"/>
+          </a:lnRef>
+          <a:fillRef idx="1">
+            <a:schemeClr val="accent1"/>
+          </a:fillRef>
+          <a:effectRef idx="0">
+            <a:schemeClr val="accent1"/>
+          </a:effectRef>
+          <a:fontRef idx="minor">
+            <a:schemeClr val="lt1"/>
+          </a:fontRef>
+        </p:style>
+        <p:txBody>
+          <a:bodyPr rtlCol="0" anchor="ctr"/>
+          <a:lstStyle>
+            <a:extLst/>
+          </a:lstStyle>
+          <a:p>
+            <a:pPr algn="ctr" eaLnBrk="1" latinLnBrk="0" hangingPunct="1"/>
+            <a:endParaRPr kumimoji="0" lang="en-US"/>
+          </a:p>
+        </p:txBody>
+      </p:sp>
+      <p:sp>
+        <p:nvSpPr>
           <p:cNvPr id="6" name="Footer Placeholder 5"/>
           <p:cNvSpPr>
             <a:spLocks noGrp="1"/>
@@ -2498,10 +3088,25 @@
             <p:ph type="ftr" sz="quarter" idx="11"/>
           </p:nvPr>
         </p:nvSpPr>
-        <p:spPr/>
-        <p:txBody>
-          <a:bodyPr/>
-          <a:lstStyle/>
+        <p:spPr>
+          <a:xfrm>
+            <a:off x="3035808" y="1170432"/>
+            <a:ext cx="5193792" cy="201168"/>
+          </a:xfrm>
+        </p:spPr>
+        <p:txBody>
+          <a:bodyPr/>
+          <a:lstStyle>
+            <a:lvl1pPr>
+              <a:defRPr>
+                <a:solidFill>
+                  <a:schemeClr val="bg1">
+                    <a:shade val="50000"/>
+                  </a:schemeClr>
+                </a:solidFill>
+              </a:defRPr>
+            </a:lvl1pPr>
+          </a:lstStyle>
           <a:p>
             <a:endParaRPr lang="en-US"/>
           </a:p>
@@ -2517,7 +3122,12 @@
             <p:ph type="sldNum" sz="quarter" idx="12"/>
           </p:nvPr>
         </p:nvSpPr>
-        <p:spPr/>
+        <p:spPr>
+          <a:xfrm>
+            <a:off x="8339328" y="1170432"/>
+            <a:ext cx="733864" cy="201168"/>
+          </a:xfrm>
+        </p:spPr>
         <p:txBody>
           <a:bodyPr/>
           <a:lstStyle/>
@@ -2534,7 +3144,7 @@
     </p:spTree>
   </p:cSld>
   <p:clrMapOvr>
-    <a:masterClrMapping/>
+    <a:overrideClrMapping bg1="lt1" tx1="dk1" bg2="lt2" tx2="dk2" accent1="accent1" accent2="accent2" accent3="accent3" accent4="accent4" accent5="accent5" accent6="accent6" hlink="hlink" folHlink="folHlink"/>
   </p:clrMapOvr>
 </p:sldLayout>
 </file>
@@ -2563,6 +3173,107 @@
       </p:grpSpPr>
       <p:sp>
         <p:nvSpPr>
+          <p:cNvPr id="10" name="Rectangle 9"/>
+          <p:cNvSpPr/>
+          <p:nvPr/>
+        </p:nvSpPr>
+        <p:spPr bwMode="invGray">
+          <a:xfrm>
+            <a:off x="0" y="1435895"/>
+            <a:ext cx="9144000" cy="45720"/>
+          </a:xfrm>
+          <a:prstGeom prst="rect">
+            <a:avLst/>
+          </a:prstGeom>
+          <a:solidFill>
+            <a:srgbClr val="FFFFFF"/>
+          </a:solidFill>
+          <a:ln w="48000" cap="flat" cmpd="thickThin" algn="ctr">
+            <a:noFill/>
+            <a:prstDash val="solid"/>
+          </a:ln>
+          <a:effectLst>
+            <a:outerShdw blurRad="31750" dist="10160" dir="5400000" algn="tl" rotWithShape="0">
+              <a:srgbClr val="000000">
+                <a:alpha val="60000"/>
+              </a:srgbClr>
+            </a:outerShdw>
+          </a:effectLst>
+        </p:spPr>
+        <p:style>
+          <a:lnRef idx="2">
+            <a:schemeClr val="accent1"/>
+          </a:lnRef>
+          <a:fillRef idx="1">
+            <a:schemeClr val="accent1"/>
+          </a:fillRef>
+          <a:effectRef idx="0">
+            <a:schemeClr val="accent1"/>
+          </a:effectRef>
+          <a:fontRef idx="minor">
+            <a:schemeClr val="lt1"/>
+          </a:fontRef>
+        </p:style>
+        <p:txBody>
+          <a:bodyPr rtlCol="0" anchor="ctr"/>
+          <a:lstStyle>
+            <a:extLst/>
+          </a:lstStyle>
+          <a:p>
+            <a:pPr algn="ctr" eaLnBrk="1" latinLnBrk="0" hangingPunct="1"/>
+            <a:endParaRPr kumimoji="0" lang="en-US"/>
+          </a:p>
+        </p:txBody>
+      </p:sp>
+      <p:sp>
+        <p:nvSpPr>
+          <p:cNvPr id="7" name="Rectangle 6"/>
+          <p:cNvSpPr/>
+          <p:nvPr/>
+        </p:nvSpPr>
+        <p:spPr bwMode="ltGray">
+          <a:xfrm>
+            <a:off x="0" y="0"/>
+            <a:ext cx="9143999" cy="1433733"/>
+          </a:xfrm>
+          <a:prstGeom prst="rect">
+            <a:avLst/>
+          </a:prstGeom>
+          <a:solidFill>
+            <a:srgbClr val="000000"/>
+          </a:solidFill>
+          <a:ln w="48000" cap="flat" cmpd="thickThin" algn="ctr">
+            <a:noFill/>
+            <a:prstDash val="solid"/>
+          </a:ln>
+        </p:spPr>
+        <p:style>
+          <a:lnRef idx="2">
+            <a:schemeClr val="accent1"/>
+          </a:lnRef>
+          <a:fillRef idx="1">
+            <a:schemeClr val="accent1"/>
+          </a:fillRef>
+          <a:effectRef idx="0">
+            <a:schemeClr val="accent1"/>
+          </a:effectRef>
+          <a:fontRef idx="minor">
+            <a:schemeClr val="lt1"/>
+          </a:fontRef>
+        </p:style>
+        <p:txBody>
+          <a:bodyPr rtlCol="0" anchor="ctr"/>
+          <a:lstStyle>
+            <a:extLst/>
+          </a:lstStyle>
+          <a:p>
+            <a:pPr algn="ctr" eaLnBrk="1" latinLnBrk="0" hangingPunct="1"/>
+            <a:endParaRPr kumimoji="0" lang="en-US"/>
+          </a:p>
+        </p:txBody>
+      </p:sp>
+      <p:sp>
+        <p:nvSpPr>
           <p:cNvPr id="2" name="Title Placeholder 1"/>
           <p:cNvSpPr>
             <a:spLocks noGrp="1"/>
@@ -2573,24 +3284,35 @@
         </p:nvSpPr>
         <p:spPr>
           <a:xfrm>
-            <a:off x="457200" y="274638"/>
-            <a:ext cx="8229600" cy="1143000"/>
+            <a:off x="457200" y="152400"/>
+            <a:ext cx="8229600" cy="1251062"/>
           </a:xfrm>
           <a:prstGeom prst="rect">
             <a:avLst/>
           </a:prstGeom>
         </p:spPr>
         <p:txBody>
-          <a:bodyPr vert="horz" lIns="91440" tIns="45720" rIns="91440" bIns="45720" rtlCol="0" anchor="ctr">
+          <a:bodyPr vert="horz" lIns="91440" rIns="45720" rtlCol="0" anchor="ctr">
             <a:normAutofit/>
+            <a:scene3d>
+              <a:camera prst="orthographicFront"/>
+              <a:lightRig rig="threePt" dir="t">
+                <a:rot lat="0" lon="0" rev="4800000"/>
+              </a:lightRig>
+            </a:scene3d>
+            <a:sp3d prstMaterial="matte">
+              <a:bevelT w="50800" h="10160"/>
+            </a:sp3d>
           </a:bodyPr>
-          <a:lstStyle/>
-          <a:p>
-            <a:r>
-              <a:rPr lang="en-US" smtClean="0"/>
+          <a:lstStyle>
+            <a:extLst/>
+          </a:lstStyle>
+          <a:p>
+            <a:r>
+              <a:rPr kumimoji="0" lang="en-US" smtClean="0"/>
               <a:t>Click to edit Master title style</a:t>
             </a:r>
-            <a:endParaRPr lang="en-US"/>
+            <a:endParaRPr kumimoji="0" lang="en-US"/>
           </a:p>
         </p:txBody>
       </p:sp>
@@ -2606,53 +3328,55 @@
         </p:nvSpPr>
         <p:spPr>
           <a:xfrm>
-            <a:off x="457200" y="1600200"/>
-            <a:ext cx="8229600" cy="4525963"/>
+            <a:off x="457200" y="1775191"/>
+            <a:ext cx="8229600" cy="4625609"/>
           </a:xfrm>
           <a:prstGeom prst="rect">
             <a:avLst/>
           </a:prstGeom>
         </p:spPr>
         <p:txBody>
-          <a:bodyPr vert="horz" lIns="91440" tIns="45720" rIns="91440" bIns="45720" rtlCol="0">
+          <a:bodyPr vert="horz" lIns="54864" tIns="91440" rtlCol="0">
             <a:normAutofit/>
           </a:bodyPr>
-          <a:lstStyle/>
-          <a:p>
-            <a:pPr lvl="0"/>
-            <a:r>
-              <a:rPr lang="en-US" smtClean="0"/>
+          <a:lstStyle>
+            <a:extLst/>
+          </a:lstStyle>
+          <a:p>
+            <a:pPr lvl="0" eaLnBrk="1" latinLnBrk="0" hangingPunct="1"/>
+            <a:r>
+              <a:rPr kumimoji="0" lang="en-US" smtClean="0"/>
               <a:t>Click to edit Master text styles</a:t>
             </a:r>
           </a:p>
           <a:p>
-            <a:pPr lvl="1"/>
-            <a:r>
-              <a:rPr lang="en-US" smtClean="0"/>
+            <a:pPr lvl="1" eaLnBrk="1" latinLnBrk="0" hangingPunct="1"/>
+            <a:r>
+              <a:rPr kumimoji="0" lang="en-US" smtClean="0"/>
               <a:t>Second level</a:t>
             </a:r>
           </a:p>
           <a:p>
-            <a:pPr lvl="2"/>
-            <a:r>
-              <a:rPr lang="en-US" smtClean="0"/>
+            <a:pPr lvl="2" eaLnBrk="1" latinLnBrk="0" hangingPunct="1"/>
+            <a:r>
+              <a:rPr kumimoji="0" lang="en-US" smtClean="0"/>
               <a:t>Third level</a:t>
             </a:r>
           </a:p>
           <a:p>
-            <a:pPr lvl="3"/>
-            <a:r>
-              <a:rPr lang="en-US" smtClean="0"/>
+            <a:pPr lvl="3" eaLnBrk="1" latinLnBrk="0" hangingPunct="1"/>
+            <a:r>
+              <a:rPr kumimoji="0" lang="en-US" smtClean="0"/>
               <a:t>Fourth level</a:t>
             </a:r>
           </a:p>
           <a:p>
-            <a:pPr lvl="4"/>
-            <a:r>
-              <a:rPr lang="en-US" smtClean="0"/>
+            <a:pPr lvl="4" eaLnBrk="1" latinLnBrk="0" hangingPunct="1"/>
+            <a:r>
+              <a:rPr kumimoji="0" lang="en-US" smtClean="0"/>
               <a:t>Fifth level</a:t>
             </a:r>
-            <a:endParaRPr lang="en-US"/>
+            <a:endParaRPr kumimoji="0" lang="en-US"/>
           </a:p>
         </p:txBody>
       </p:sp>
@@ -2668,25 +3392,26 @@
         </p:nvSpPr>
         <p:spPr>
           <a:xfrm>
-            <a:off x="457200" y="6356350"/>
-            <a:ext cx="2133600" cy="365125"/>
+            <a:off x="457200" y="6476999"/>
+            <a:ext cx="2133600" cy="274320"/>
           </a:xfrm>
           <a:prstGeom prst="rect">
             <a:avLst/>
           </a:prstGeom>
         </p:spPr>
         <p:txBody>
-          <a:bodyPr vert="horz" lIns="91440" tIns="45720" rIns="91440" bIns="45720" rtlCol="0" anchor="ctr"/>
+          <a:bodyPr vert="horz" lIns="109728" rIns="45720" bIns="0" rtlCol="0" anchor="b"/>
           <a:lstStyle>
-            <a:lvl1pPr algn="l">
-              <a:defRPr sz="1200">
+            <a:lvl1pPr algn="l" eaLnBrk="1" latinLnBrk="0" hangingPunct="1">
+              <a:defRPr kumimoji="0" sz="1200">
                 <a:solidFill>
                   <a:schemeClr val="tx1">
-                    <a:tint val="75000"/>
+                    <a:tint val="95000"/>
                   </a:schemeClr>
                 </a:solidFill>
               </a:defRPr>
             </a:lvl1pPr>
+            <a:extLst/>
           </a:lstStyle>
           <a:p>
             <a:fld id="{4F4EEE5D-B5E5-4F32-9EC9-B7EC884CD92D}" type="datetimeFigureOut">
@@ -2710,25 +3435,26 @@
         </p:nvSpPr>
         <p:spPr>
           <a:xfrm>
-            <a:off x="3124200" y="6356350"/>
-            <a:ext cx="2895600" cy="365125"/>
+            <a:off x="2640596" y="6476999"/>
+            <a:ext cx="5507719" cy="274320"/>
           </a:xfrm>
           <a:prstGeom prst="rect">
             <a:avLst/>
           </a:prstGeom>
         </p:spPr>
         <p:txBody>
-          <a:bodyPr vert="horz" lIns="91440" tIns="45720" rIns="91440" bIns="45720" rtlCol="0" anchor="ctr"/>
+          <a:bodyPr vert="horz" lIns="45720" rIns="45720" bIns="0" rtlCol="0" anchor="b"/>
           <a:lstStyle>
-            <a:lvl1pPr algn="ctr">
-              <a:defRPr sz="1200">
+            <a:lvl1pPr algn="l" eaLnBrk="1" latinLnBrk="0" hangingPunct="1">
+              <a:defRPr kumimoji="0" sz="1200">
                 <a:solidFill>
                   <a:schemeClr val="tx1">
-                    <a:tint val="75000"/>
+                    <a:tint val="95000"/>
                   </a:schemeClr>
                 </a:solidFill>
               </a:defRPr>
             </a:lvl1pPr>
+            <a:extLst/>
           </a:lstStyle>
           <a:p>
             <a:endParaRPr lang="en-US"/>
@@ -2747,25 +3473,26 @@
         </p:nvSpPr>
         <p:spPr>
           <a:xfrm>
-            <a:off x="6553200" y="6356350"/>
-            <a:ext cx="2133600" cy="365125"/>
+            <a:off x="8204396" y="6476999"/>
+            <a:ext cx="733864" cy="274320"/>
           </a:xfrm>
           <a:prstGeom prst="rect">
             <a:avLst/>
           </a:prstGeom>
         </p:spPr>
         <p:txBody>
-          <a:bodyPr vert="horz" lIns="91440" tIns="45720" rIns="91440" bIns="45720" rtlCol="0" anchor="ctr"/>
+          <a:bodyPr vert="horz" bIns="0" rtlCol="0" anchor="b"/>
           <a:lstStyle>
-            <a:lvl1pPr algn="r">
-              <a:defRPr sz="1200">
+            <a:lvl1pPr algn="r" eaLnBrk="1" latinLnBrk="0" hangingPunct="1">
+              <a:defRPr kumimoji="0" sz="1200">
                 <a:solidFill>
                   <a:schemeClr val="tx1">
-                    <a:tint val="75000"/>
+                    <a:tint val="95000"/>
                   </a:schemeClr>
                 </a:solidFill>
               </a:defRPr>
             </a:lvl1pPr>
+            <a:extLst/>
           </a:lstStyle>
           <a:p>
             <a:fld id="{893971C5-3812-4406-A822-27A93B7E2D25}" type="slidenum">
@@ -2781,43 +3508,51 @@
   </p:cSld>
   <p:clrMap bg1="lt1" tx1="dk1" bg2="lt2" tx2="dk2" accent1="accent1" accent2="accent2" accent3="accent3" accent4="accent4" accent5="accent5" accent6="accent6" hlink="hlink" folHlink="folHlink"/>
   <p:sldLayoutIdLst>
-    <p:sldLayoutId id="2147483649" r:id="rId1"/>
-    <p:sldLayoutId id="2147483650" r:id="rId2"/>
-    <p:sldLayoutId id="2147483651" r:id="rId3"/>
-    <p:sldLayoutId id="2147483652" r:id="rId4"/>
-    <p:sldLayoutId id="2147483653" r:id="rId5"/>
-    <p:sldLayoutId id="2147483654" r:id="rId6"/>
-    <p:sldLayoutId id="2147483655" r:id="rId7"/>
-    <p:sldLayoutId id="2147483656" r:id="rId8"/>
-    <p:sldLayoutId id="2147483657" r:id="rId9"/>
-    <p:sldLayoutId id="2147483658" r:id="rId10"/>
-    <p:sldLayoutId id="2147483659" r:id="rId11"/>
+    <p:sldLayoutId id="2147483685" r:id="rId1"/>
+    <p:sldLayoutId id="2147483686" r:id="rId2"/>
+    <p:sldLayoutId id="2147483687" r:id="rId3"/>
+    <p:sldLayoutId id="2147483688" r:id="rId4"/>
+    <p:sldLayoutId id="2147483689" r:id="rId5"/>
+    <p:sldLayoutId id="2147483690" r:id="rId6"/>
+    <p:sldLayoutId id="2147483691" r:id="rId7"/>
+    <p:sldLayoutId id="2147483692" r:id="rId8"/>
+    <p:sldLayoutId id="2147483693" r:id="rId9"/>
+    <p:sldLayoutId id="2147483694" r:id="rId10"/>
+    <p:sldLayoutId id="2147483695" r:id="rId11"/>
   </p:sldLayoutIdLst>
   <p:txStyles>
     <p:titleStyle>
-      <a:lvl1pPr algn="ctr" defTabSz="914400" rtl="0" eaLnBrk="1" latinLnBrk="0" hangingPunct="1">
+      <a:lvl1pPr algn="l" rtl="0" eaLnBrk="1" latinLnBrk="0" hangingPunct="1">
         <a:spcBef>
           <a:spcPct val="0"/>
         </a:spcBef>
         <a:buNone/>
-        <a:defRPr sz="4400" kern="1200">
+        <a:defRPr kumimoji="0" sz="4500" b="1" kern="1200">
           <a:solidFill>
-            <a:schemeClr val="tx1"/>
+            <a:schemeClr val="accent1">
+              <a:satMod val="150000"/>
+            </a:schemeClr>
           </a:solidFill>
+          <a:effectLst/>
           <a:latin typeface="+mj-lt"/>
           <a:ea typeface="+mj-ea"/>
           <a:cs typeface="+mj-cs"/>
         </a:defRPr>
       </a:lvl1pPr>
+      <a:extLst/>
     </p:titleStyle>
     <p:bodyStyle>
-      <a:lvl1pPr marL="342900" indent="-342900" algn="l" defTabSz="914400" rtl="0" eaLnBrk="1" latinLnBrk="0" hangingPunct="1">
+      <a:lvl1pPr marL="438912" indent="-320040" algn="l" rtl="0" eaLnBrk="1" latinLnBrk="0" hangingPunct="1">
         <a:spcBef>
-          <a:spcPct val="20000"/>
+          <a:spcPts val="0"/>
         </a:spcBef>
-        <a:buFont typeface="Arial" pitchFamily="34" charset="0"/>
-        <a:buChar char="•"/>
-        <a:defRPr sz="3200" kern="1200">
+        <a:buClr>
+          <a:schemeClr val="accent1"/>
+        </a:buClr>
+        <a:buSzPct val="80000"/>
+        <a:buFont typeface="Wingdings 2"/>
+        <a:buChar char=""/>
+        <a:defRPr kumimoji="0" sz="3200" kern="1200">
           <a:solidFill>
             <a:schemeClr val="tx1"/>
           </a:solidFill>
@@ -2826,13 +3561,17 @@
           <a:cs typeface="+mn-cs"/>
         </a:defRPr>
       </a:lvl1pPr>
-      <a:lvl2pPr marL="742950" indent="-285750" algn="l" defTabSz="914400" rtl="0" eaLnBrk="1" latinLnBrk="0" hangingPunct="1">
+      <a:lvl2pPr marL="731520" indent="-274320" algn="l" rtl="0" eaLnBrk="1" latinLnBrk="0" hangingPunct="1">
         <a:spcBef>
           <a:spcPct val="20000"/>
         </a:spcBef>
-        <a:buFont typeface="Arial" pitchFamily="34" charset="0"/>
-        <a:buChar char="–"/>
-        <a:defRPr sz="2800" kern="1200">
+        <a:buClr>
+          <a:schemeClr val="accent2"/>
+        </a:buClr>
+        <a:buSzPct val="90000"/>
+        <a:buFont typeface="Wingdings"/>
+        <a:buChar char=""/>
+        <a:defRPr kumimoji="0" sz="2800" kern="1200">
           <a:solidFill>
             <a:schemeClr val="tx1"/>
           </a:solidFill>
@@ -2841,13 +3580,16 @@
           <a:cs typeface="+mn-cs"/>
         </a:defRPr>
       </a:lvl2pPr>
-      <a:lvl3pPr marL="1143000" indent="-228600" algn="l" defTabSz="914400" rtl="0" eaLnBrk="1" latinLnBrk="0" hangingPunct="1">
+      <a:lvl3pPr marL="996696" indent="-228600" algn="l" rtl="0" eaLnBrk="1" latinLnBrk="0" hangingPunct="1">
         <a:spcBef>
           <a:spcPct val="20000"/>
         </a:spcBef>
-        <a:buFont typeface="Arial" pitchFamily="34" charset="0"/>
-        <a:buChar char="•"/>
-        <a:defRPr sz="2400" kern="1200">
+        <a:buClr>
+          <a:schemeClr val="accent3"/>
+        </a:buClr>
+        <a:buFont typeface="Arial"/>
+        <a:buChar char="▪"/>
+        <a:defRPr kumimoji="0" sz="2400" kern="1200">
           <a:solidFill>
             <a:schemeClr val="tx1"/>
           </a:solidFill>
@@ -2856,13 +3598,16 @@
           <a:cs typeface="+mn-cs"/>
         </a:defRPr>
       </a:lvl3pPr>
-      <a:lvl4pPr marL="1600200" indent="-228600" algn="l" defTabSz="914400" rtl="0" eaLnBrk="1" latinLnBrk="0" hangingPunct="1">
+      <a:lvl4pPr marL="1216152" indent="-182880" algn="l" rtl="0" eaLnBrk="1" latinLnBrk="0" hangingPunct="1">
         <a:spcBef>
           <a:spcPct val="20000"/>
         </a:spcBef>
-        <a:buFont typeface="Arial" pitchFamily="34" charset="0"/>
-        <a:buChar char="–"/>
-        <a:defRPr sz="2000" kern="1200">
+        <a:buClr>
+          <a:schemeClr val="accent4"/>
+        </a:buClr>
+        <a:buFont typeface="Arial"/>
+        <a:buChar char="▪"/>
+        <a:defRPr kumimoji="0" sz="2000" kern="1200">
           <a:solidFill>
             <a:schemeClr val="tx1"/>
           </a:solidFill>
@@ -2871,13 +3616,16 @@
           <a:cs typeface="+mn-cs"/>
         </a:defRPr>
       </a:lvl4pPr>
-      <a:lvl5pPr marL="2057400" indent="-228600" algn="l" defTabSz="914400" rtl="0" eaLnBrk="1" latinLnBrk="0" hangingPunct="1">
+      <a:lvl5pPr marL="1426464" indent="-182880" algn="l" rtl="0" eaLnBrk="1" latinLnBrk="0" hangingPunct="1">
         <a:spcBef>
           <a:spcPct val="20000"/>
         </a:spcBef>
-        <a:buFont typeface="Arial" pitchFamily="34" charset="0"/>
-        <a:buChar char="»"/>
-        <a:defRPr sz="2000" kern="1200">
+        <a:buClr>
+          <a:schemeClr val="accent5"/>
+        </a:buClr>
+        <a:buFont typeface="Wingdings 3"/>
+        <a:buChar char=""/>
+        <a:defRPr kumimoji="0" lang="en-US" sz="2000" kern="1200" smtClean="0">
           <a:solidFill>
             <a:schemeClr val="tx1"/>
           </a:solidFill>
@@ -2886,13 +3634,17 @@
           <a:cs typeface="+mn-cs"/>
         </a:defRPr>
       </a:lvl5pPr>
-      <a:lvl6pPr marL="2514600" indent="-228600" algn="l" defTabSz="914400" rtl="0" eaLnBrk="1" latinLnBrk="0" hangingPunct="1">
+      <a:lvl6pPr marL="1627632" indent="-182880" algn="l" rtl="0" eaLnBrk="1" latinLnBrk="0" hangingPunct="1">
         <a:spcBef>
           <a:spcPct val="20000"/>
         </a:spcBef>
-        <a:buFont typeface="Arial" pitchFamily="34" charset="0"/>
-        <a:buChar char="•"/>
-        <a:defRPr sz="2000" kern="1200">
+        <a:buClr>
+          <a:schemeClr val="accent6"/>
+        </a:buClr>
+        <a:buSzPct val="100000"/>
+        <a:buFont typeface="Wingdings 2"/>
+        <a:buChar char=""/>
+        <a:defRPr kumimoji="0" sz="2000" kern="1200">
           <a:solidFill>
             <a:schemeClr val="tx1"/>
           </a:solidFill>
@@ -2901,13 +3653,17 @@
           <a:cs typeface="+mn-cs"/>
         </a:defRPr>
       </a:lvl6pPr>
-      <a:lvl7pPr marL="2971800" indent="-228600" algn="l" defTabSz="914400" rtl="0" eaLnBrk="1" latinLnBrk="0" hangingPunct="1">
+      <a:lvl7pPr marL="1828800" indent="-182880" algn="l" rtl="0" eaLnBrk="1" latinLnBrk="0" hangingPunct="1">
         <a:spcBef>
           <a:spcPct val="20000"/>
         </a:spcBef>
-        <a:buFont typeface="Arial" pitchFamily="34" charset="0"/>
-        <a:buChar char="•"/>
-        <a:defRPr sz="2000" kern="1200">
+        <a:buClr>
+          <a:schemeClr val="accent1"/>
+        </a:buClr>
+        <a:buSzPct val="100000"/>
+        <a:buFont typeface="Wingdings 2"/>
+        <a:buChar char=""/>
+        <a:defRPr kumimoji="0" sz="1800" kern="1200">
           <a:solidFill>
             <a:schemeClr val="tx1"/>
           </a:solidFill>
@@ -2916,13 +3672,16 @@
           <a:cs typeface="+mn-cs"/>
         </a:defRPr>
       </a:lvl7pPr>
-      <a:lvl8pPr marL="3429000" indent="-228600" algn="l" defTabSz="914400" rtl="0" eaLnBrk="1" latinLnBrk="0" hangingPunct="1">
+      <a:lvl8pPr marL="2029968" indent="-182880" algn="l" rtl="0" eaLnBrk="1" latinLnBrk="0" hangingPunct="1">
         <a:spcBef>
           <a:spcPct val="20000"/>
         </a:spcBef>
-        <a:buFont typeface="Arial" pitchFamily="34" charset="0"/>
-        <a:buChar char="•"/>
-        <a:defRPr sz="2000" kern="1200">
+        <a:buClr>
+          <a:schemeClr val="accent2"/>
+        </a:buClr>
+        <a:buFont typeface="Wingdings 2" pitchFamily="18" charset="2"/>
+        <a:buChar char=""/>
+        <a:defRPr kumimoji="0" sz="1800" kern="1200">
           <a:solidFill>
             <a:schemeClr val="tx1"/>
           </a:solidFill>
@@ -2931,13 +3690,16 @@
           <a:cs typeface="+mn-cs"/>
         </a:defRPr>
       </a:lvl8pPr>
-      <a:lvl9pPr marL="3886200" indent="-228600" algn="l" defTabSz="914400" rtl="0" eaLnBrk="1" latinLnBrk="0" hangingPunct="1">
+      <a:lvl9pPr marL="2231136" indent="-182880" algn="l" rtl="0" eaLnBrk="1" latinLnBrk="0" hangingPunct="1">
         <a:spcBef>
           <a:spcPct val="20000"/>
         </a:spcBef>
-        <a:buFont typeface="Arial" pitchFamily="34" charset="0"/>
-        <a:buChar char="•"/>
-        <a:defRPr sz="2000" kern="1200">
+        <a:buClr>
+          <a:schemeClr val="accent3"/>
+        </a:buClr>
+        <a:buFont typeface="Wingdings 2" pitchFamily="18" charset="2"/>
+        <a:buChar char=""/>
+        <a:defRPr kumimoji="0" sz="1800" kern="1200" baseline="0">
           <a:solidFill>
             <a:schemeClr val="tx1"/>
           </a:solidFill>
@@ -2946,13 +3708,11 @@
           <a:cs typeface="+mn-cs"/>
         </a:defRPr>
       </a:lvl9pPr>
+      <a:extLst/>
     </p:bodyStyle>
     <p:otherStyle>
-      <a:defPPr>
-        <a:defRPr lang="en-US"/>
-      </a:defPPr>
-      <a:lvl1pPr marL="0" algn="l" defTabSz="914400" rtl="0" eaLnBrk="1" latinLnBrk="0" hangingPunct="1">
-        <a:defRPr sz="1800" kern="1200">
+      <a:lvl1pPr marL="0" algn="l" rtl="0" eaLnBrk="1" latinLnBrk="0" hangingPunct="1">
+        <a:defRPr kumimoji="0" kern="1200">
           <a:solidFill>
             <a:schemeClr val="tx1"/>
           </a:solidFill>
@@ -2961,8 +3721,8 @@
           <a:cs typeface="+mn-cs"/>
         </a:defRPr>
       </a:lvl1pPr>
-      <a:lvl2pPr marL="457200" algn="l" defTabSz="914400" rtl="0" eaLnBrk="1" latinLnBrk="0" hangingPunct="1">
-        <a:defRPr sz="1800" kern="1200">
+      <a:lvl2pPr marL="457200" algn="l" rtl="0" eaLnBrk="1" latinLnBrk="0" hangingPunct="1">
+        <a:defRPr kumimoji="0" kern="1200">
           <a:solidFill>
             <a:schemeClr val="tx1"/>
           </a:solidFill>
@@ -2971,8 +3731,8 @@
           <a:cs typeface="+mn-cs"/>
         </a:defRPr>
       </a:lvl2pPr>
-      <a:lvl3pPr marL="914400" algn="l" defTabSz="914400" rtl="0" eaLnBrk="1" latinLnBrk="0" hangingPunct="1">
-        <a:defRPr sz="1800" kern="1200">
+      <a:lvl3pPr marL="914400" algn="l" rtl="0" eaLnBrk="1" latinLnBrk="0" hangingPunct="1">
+        <a:defRPr kumimoji="0" kern="1200">
           <a:solidFill>
             <a:schemeClr val="tx1"/>
           </a:solidFill>
@@ -2981,8 +3741,8 @@
           <a:cs typeface="+mn-cs"/>
         </a:defRPr>
       </a:lvl3pPr>
-      <a:lvl4pPr marL="1371600" algn="l" defTabSz="914400" rtl="0" eaLnBrk="1" latinLnBrk="0" hangingPunct="1">
-        <a:defRPr sz="1800" kern="1200">
+      <a:lvl4pPr marL="1371600" algn="l" rtl="0" eaLnBrk="1" latinLnBrk="0" hangingPunct="1">
+        <a:defRPr kumimoji="0" kern="1200">
           <a:solidFill>
             <a:schemeClr val="tx1"/>
           </a:solidFill>
@@ -2991,8 +3751,8 @@
           <a:cs typeface="+mn-cs"/>
         </a:defRPr>
       </a:lvl4pPr>
-      <a:lvl5pPr marL="1828800" algn="l" defTabSz="914400" rtl="0" eaLnBrk="1" latinLnBrk="0" hangingPunct="1">
-        <a:defRPr sz="1800" kern="1200">
+      <a:lvl5pPr marL="1828800" algn="l" rtl="0" eaLnBrk="1" latinLnBrk="0" hangingPunct="1">
+        <a:defRPr kumimoji="0" kern="1200">
           <a:solidFill>
             <a:schemeClr val="tx1"/>
           </a:solidFill>
@@ -3001,8 +3761,8 @@
           <a:cs typeface="+mn-cs"/>
         </a:defRPr>
       </a:lvl5pPr>
-      <a:lvl6pPr marL="2286000" algn="l" defTabSz="914400" rtl="0" eaLnBrk="1" latinLnBrk="0" hangingPunct="1">
-        <a:defRPr sz="1800" kern="1200">
+      <a:lvl6pPr marL="2286000" algn="l" rtl="0" eaLnBrk="1" latinLnBrk="0" hangingPunct="1">
+        <a:defRPr kumimoji="0" kern="1200">
           <a:solidFill>
             <a:schemeClr val="tx1"/>
           </a:solidFill>
@@ -3011,8 +3771,8 @@
           <a:cs typeface="+mn-cs"/>
         </a:defRPr>
       </a:lvl6pPr>
-      <a:lvl7pPr marL="2743200" algn="l" defTabSz="914400" rtl="0" eaLnBrk="1" latinLnBrk="0" hangingPunct="1">
-        <a:defRPr sz="1800" kern="1200">
+      <a:lvl7pPr marL="2743200" algn="l" rtl="0" eaLnBrk="1" latinLnBrk="0" hangingPunct="1">
+        <a:defRPr kumimoji="0" kern="1200">
           <a:solidFill>
             <a:schemeClr val="tx1"/>
           </a:solidFill>
@@ -3021,8 +3781,8 @@
           <a:cs typeface="+mn-cs"/>
         </a:defRPr>
       </a:lvl7pPr>
-      <a:lvl8pPr marL="3200400" algn="l" defTabSz="914400" rtl="0" eaLnBrk="1" latinLnBrk="0" hangingPunct="1">
-        <a:defRPr sz="1800" kern="1200">
+      <a:lvl8pPr marL="3200400" algn="l" rtl="0" eaLnBrk="1" latinLnBrk="0" hangingPunct="1">
+        <a:defRPr kumimoji="0" kern="1200">
           <a:solidFill>
             <a:schemeClr val="tx1"/>
           </a:solidFill>
@@ -3031,8 +3791,8 @@
           <a:cs typeface="+mn-cs"/>
         </a:defRPr>
       </a:lvl8pPr>
-      <a:lvl9pPr marL="3657600" algn="l" defTabSz="914400" rtl="0" eaLnBrk="1" latinLnBrk="0" hangingPunct="1">
-        <a:defRPr sz="1800" kern="1200">
+      <a:lvl9pPr marL="3657600" algn="l" rtl="0" eaLnBrk="1" latinLnBrk="0" hangingPunct="1">
+        <a:defRPr kumimoji="0" kern="1200">
           <a:solidFill>
             <a:schemeClr val="tx1"/>
           </a:solidFill>
@@ -3041,6 +3801,7 @@
           <a:cs typeface="+mn-cs"/>
         </a:defRPr>
       </a:lvl9pPr>
+      <a:extLst/>
     </p:otherStyle>
   </p:txStyles>
 </p:sldMaster>
@@ -3130,6 +3891,13 @@
   <p:clrMapOvr>
     <a:masterClrMapping/>
   </p:clrMapOvr>
+  <p:timing>
+    <p:tnLst>
+      <p:par>
+        <p:cTn id="1" dur="indefinite" restart="never" nodeType="tmRoot"/>
+      </p:par>
+    </p:tnLst>
+  </p:timing>
 </p:sld>
 </file>
 
@@ -3235,6 +4003,13 @@
   <p:clrMapOvr>
     <a:masterClrMapping/>
   </p:clrMapOvr>
+  <p:timing>
+    <p:tnLst>
+      <p:par>
+        <p:cTn id="1" dur="indefinite" restart="never" nodeType="tmRoot"/>
+      </p:par>
+    </p:tnLst>
+  </p:timing>
 </p:sld>
 </file>
 
@@ -3291,7 +4066,7 @@
         <p:spPr/>
         <p:txBody>
           <a:bodyPr>
-            <a:normAutofit fontScale="85000" lnSpcReduction="20000"/>
+            <a:normAutofit fontScale="92500" lnSpcReduction="10000"/>
           </a:bodyPr>
           <a:lstStyle/>
           <a:p>
@@ -3367,6 +4142,13 @@
   <p:clrMapOvr>
     <a:masterClrMapping/>
   </p:clrMapOvr>
+  <p:timing>
+    <p:tnLst>
+      <p:par>
+        <p:cTn id="1" dur="indefinite" restart="never" nodeType="tmRoot"/>
+      </p:par>
+    </p:tnLst>
+  </p:timing>
 </p:sld>
 </file>
 
@@ -3436,20 +4218,37 @@
           <a:p>
             <a:r>
               <a:rPr lang="en-PH" dirty="0" smtClean="0"/>
-              <a:t>Field Validation</a:t>
-            </a:r>
+              <a:t>No Field Validations</a:t>
+            </a:r>
+            <a:endParaRPr lang="en-PH" dirty="0" smtClean="0"/>
           </a:p>
           <a:p>
             <a:r>
               <a:rPr lang="en-PH" dirty="0" smtClean="0"/>
-              <a:t>Only one book can be purchased</a:t>
-            </a:r>
+              <a:t>Only one book can be </a:t>
+            </a:r>
+            <a:r>
+              <a:rPr lang="en-PH" dirty="0" smtClean="0"/>
+              <a:t>purchased at a time</a:t>
+            </a:r>
+            <a:endParaRPr lang="en-PH" dirty="0" smtClean="0"/>
           </a:p>
           <a:p>
             <a:r>
               <a:rPr lang="en-PH" dirty="0" smtClean="0"/>
               <a:t>User can see admin tabs but can’t access those </a:t>
             </a:r>
+            <a:r>
+              <a:rPr lang="en-PH" dirty="0" smtClean="0"/>
+              <a:t>tabs</a:t>
+            </a:r>
+          </a:p>
+          <a:p>
+            <a:r>
+              <a:rPr lang="en-PH" dirty="0" smtClean="0"/>
+              <a:t>No pagination </a:t>
+            </a:r>
+            <a:endParaRPr lang="en-PH" dirty="0" smtClean="0"/>
           </a:p>
         </p:txBody>
       </p:sp>
@@ -3458,6 +4257,13 @@
   <p:clrMapOvr>
     <a:masterClrMapping/>
   </p:clrMapOvr>
+  <p:timing>
+    <p:tnLst>
+      <p:par>
+        <p:cTn id="1" dur="indefinite" restart="never" nodeType="tmRoot"/>
+      </p:par>
+    </p:tnLst>
+  </p:timing>
 </p:sld>
 </file>
 
@@ -3517,22 +4323,30 @@
           <a:lstStyle/>
           <a:p>
             <a:r>
-              <a:rPr lang="en-PH" smtClean="0"/>
-              <a:t>Project </a:t>
-            </a:r>
-            <a:r>
-              <a:rPr lang="en-PH" smtClean="0"/>
-              <a:t>Integration</a:t>
-            </a:r>
-          </a:p>
-          <a:p>
-            <a:r>
-              <a:rPr lang="en-PH" smtClean="0"/>
-              <a:t>Deselect </a:t>
-            </a:r>
-            <a:r>
               <a:rPr lang="en-PH" dirty="0" smtClean="0"/>
-              <a:t>grid row</a:t>
+              <a:t>Project Integration</a:t>
+            </a:r>
+          </a:p>
+          <a:p>
+            <a:r>
+              <a:rPr lang="en-PH" dirty="0" smtClean="0"/>
+              <a:t>Deselect grid </a:t>
+            </a:r>
+            <a:r>
+              <a:rPr lang="en-PH" dirty="0" smtClean="0"/>
+              <a:t>row</a:t>
+            </a:r>
+          </a:p>
+          <a:p>
+            <a:r>
+              <a:rPr lang="en-PH" dirty="0" smtClean="0"/>
+              <a:t>Hide admin tabs</a:t>
+            </a:r>
+          </a:p>
+          <a:p>
+            <a:r>
+              <a:rPr lang="en-PH" dirty="0" smtClean="0"/>
+              <a:t>Naming conventions</a:t>
             </a:r>
             <a:endParaRPr lang="en-PH" dirty="0" smtClean="0"/>
           </a:p>
@@ -3546,13 +4360,20 @@
   <p:clrMapOvr>
     <a:masterClrMapping/>
   </p:clrMapOvr>
+  <p:timing>
+    <p:tnLst>
+      <p:par>
+        <p:cTn id="1" dur="indefinite" restart="never" nodeType="tmRoot"/>
+      </p:par>
+    </p:tnLst>
+  </p:timing>
 </p:sld>
 </file>
 
 <file path=ppt/theme/theme1.xml><?xml version="1.0" encoding="utf-8"?>
-<a:theme xmlns:a="http://schemas.openxmlformats.org/drawingml/2006/main" name="Office Theme">
+<a:theme xmlns:a="http://schemas.openxmlformats.org/drawingml/2006/main" name="Module">
   <a:themeElements>
-    <a:clrScheme name="Office">
+    <a:clrScheme name="Module">
       <a:dk1>
         <a:sysClr val="windowText" lastClr="000000"/>
       </a:dk1>
@@ -3560,52 +4381,52 @@
         <a:sysClr val="window" lastClr="FFFFFF"/>
       </a:lt1>
       <a:dk2>
-        <a:srgbClr val="1F497D"/>
+        <a:srgbClr val="5A6378"/>
       </a:dk2>
       <a:lt2>
-        <a:srgbClr val="EEECE1"/>
+        <a:srgbClr val="D4D4D6"/>
       </a:lt2>
       <a:accent1>
-        <a:srgbClr val="4F81BD"/>
+        <a:srgbClr val="F0AD00"/>
       </a:accent1>
       <a:accent2>
-        <a:srgbClr val="C0504D"/>
+        <a:srgbClr val="60B5CC"/>
       </a:accent2>
       <a:accent3>
-        <a:srgbClr val="9BBB59"/>
+        <a:srgbClr val="E66C7D"/>
       </a:accent3>
       <a:accent4>
-        <a:srgbClr val="8064A2"/>
+        <a:srgbClr val="6BB76D"/>
       </a:accent4>
       <a:accent5>
-        <a:srgbClr val="4BACC6"/>
+        <a:srgbClr val="E88651"/>
       </a:accent5>
       <a:accent6>
-        <a:srgbClr val="F79646"/>
+        <a:srgbClr val="C64847"/>
       </a:accent6>
       <a:hlink>
-        <a:srgbClr val="0000FF"/>
+        <a:srgbClr val="168BBA"/>
       </a:hlink>
       <a:folHlink>
-        <a:srgbClr val="800080"/>
+        <a:srgbClr val="680000"/>
       </a:folHlink>
     </a:clrScheme>
-    <a:fontScheme name="Office">
+    <a:fontScheme name="Module">
       <a:majorFont>
-        <a:latin typeface="Calibri"/>
+        <a:latin typeface="Corbel"/>
         <a:ea typeface=""/>
         <a:cs typeface=""/>
-        <a:font script="Jpan" typeface="ＭＳ Ｐゴシック"/>
-        <a:font script="Hang" typeface="맑은 고딕"/>
-        <a:font script="Hans" typeface="宋体"/>
+        <a:font script="Jpan" typeface="HGｺﾞｼｯｸM"/>
+        <a:font script="Hang" typeface="HY엽서L"/>
+        <a:font script="Hans" typeface="华文楷体"/>
         <a:font script="Hant" typeface="新細明體"/>
-        <a:font script="Arab" typeface="Times New Roman"/>
-        <a:font script="Hebr" typeface="Times New Roman"/>
-        <a:font script="Thai" typeface="Angsana New"/>
+        <a:font script="Arab" typeface="Tahoma"/>
+        <a:font script="Hebr" typeface="Miriam"/>
+        <a:font script="Thai" typeface="DilleniaUPC"/>
         <a:font script="Ethi" typeface="Nyala"/>
         <a:font script="Beng" typeface="Vrinda"/>
         <a:font script="Gujr" typeface="Shruti"/>
-        <a:font script="Khmr" typeface="MoolBoran"/>
+        <a:font script="Khmr" typeface="DaunPenh"/>
         <a:font script="Knda" typeface="Tunga"/>
         <a:font script="Guru" typeface="Raavi"/>
         <a:font script="Cans" typeface="Euphemia"/>
@@ -3622,20 +4443,20 @@
         <a:font script="Laoo" typeface="DokChampa"/>
         <a:font script="Sinh" typeface="Iskoola Pota"/>
         <a:font script="Mong" typeface="Mongolian Baiti"/>
-        <a:font script="Viet" typeface="Times New Roman"/>
+        <a:font script="Viet" typeface="Arial"/>
         <a:font script="Uigh" typeface="Microsoft Uighur"/>
       </a:majorFont>
       <a:minorFont>
-        <a:latin typeface="Calibri"/>
+        <a:latin typeface="Corbel"/>
         <a:ea typeface=""/>
         <a:cs typeface=""/>
-        <a:font script="Jpan" typeface="ＭＳ Ｐゴシック"/>
-        <a:font script="Hang" typeface="맑은 고딕"/>
-        <a:font script="Hans" typeface="宋体"/>
+        <a:font script="Jpan" typeface="HGｺﾞｼｯｸM"/>
+        <a:font script="Hang" typeface="HY엽서L"/>
+        <a:font script="Hans" typeface="华文楷体"/>
         <a:font script="Hant" typeface="新細明體"/>
-        <a:font script="Arab" typeface="Arial"/>
-        <a:font script="Hebr" typeface="Arial"/>
-        <a:font script="Thai" typeface="Cordia New"/>
+        <a:font script="Arab" typeface="Tahoma"/>
+        <a:font script="Hebr" typeface="Miriam"/>
+        <a:font script="Thai" typeface="DilleniaUPC"/>
         <a:font script="Ethi" typeface="Nyala"/>
         <a:font script="Beng" typeface="Vrinda"/>
         <a:font script="Gujr" typeface="Shruti"/>
@@ -3660,7 +4481,7 @@
         <a:font script="Uigh" typeface="Microsoft Uighur"/>
       </a:minorFont>
     </a:fontScheme>
-    <a:fmtScheme name="Office">
+    <a:fmtScheme name="Module">
       <a:fillStyleLst>
         <a:solidFill>
           <a:schemeClr val="phClr"/>
@@ -3692,20 +4513,20 @@
           <a:gsLst>
             <a:gs pos="0">
               <a:schemeClr val="phClr">
-                <a:shade val="51000"/>
-                <a:satMod val="130000"/>
+                <a:shade val="47500"/>
+                <a:satMod val="137000"/>
               </a:schemeClr>
             </a:gs>
-            <a:gs pos="80000">
+            <a:gs pos="55000">
               <a:schemeClr val="phClr">
-                <a:shade val="93000"/>
-                <a:satMod val="130000"/>
+                <a:shade val="69000"/>
+                <a:satMod val="137000"/>
               </a:schemeClr>
             </a:gs>
             <a:gs pos="100000">
               <a:schemeClr val="phClr">
-                <a:shade val="94000"/>
-                <a:satMod val="135000"/>
+                <a:shade val="98000"/>
+                <a:satMod val="137000"/>
               </a:schemeClr>
             </a:gs>
           </a:gsLst>
@@ -3713,7 +4534,7 @@
         </a:gradFill>
       </a:fillStyleLst>
       <a:lnStyleLst>
-        <a:ln w="9525" cap="flat" cmpd="sng" algn="ctr">
+        <a:ln w="6350" cap="rnd" cmpd="sng" algn="ctr">
           <a:solidFill>
             <a:schemeClr val="phClr">
               <a:shade val="95000"/>
@@ -3722,13 +4543,13 @@
           </a:solidFill>
           <a:prstDash val="solid"/>
         </a:ln>
-        <a:ln w="25400" cap="flat" cmpd="sng" algn="ctr">
+        <a:ln w="48000" cap="flat" cmpd="thickThin" algn="ctr">
           <a:solidFill>
             <a:schemeClr val="phClr"/>
           </a:solidFill>
           <a:prstDash val="solid"/>
         </a:ln>
-        <a:ln w="38100" cap="flat" cmpd="sng" algn="ctr">
+        <a:ln w="48500" cap="flat" cmpd="thickThin" algn="ctr">
           <a:solidFill>
             <a:schemeClr val="phClr"/>
           </a:solidFill>
@@ -3738,7 +4559,7 @@
       <a:effectStyleLst>
         <a:effectStyle>
           <a:effectLst>
-            <a:outerShdw blurRad="40000" dist="20000" dir="5400000" rotWithShape="0">
+            <a:outerShdw blurRad="45000" dist="25000" dir="5400000" rotWithShape="0">
               <a:srgbClr val="000000">
                 <a:alpha val="38000"/>
               </a:srgbClr>
@@ -3747,31 +4568,31 @@
         </a:effectStyle>
         <a:effectStyle>
           <a:effectLst>
-            <a:outerShdw blurRad="40000" dist="23000" dir="5400000" rotWithShape="0">
+            <a:outerShdw blurRad="39000" dist="25400" dir="5400000" rotWithShape="0">
               <a:srgbClr val="000000">
-                <a:alpha val="35000"/>
+                <a:alpha val="38000"/>
               </a:srgbClr>
             </a:outerShdw>
           </a:effectLst>
         </a:effectStyle>
         <a:effectStyle>
           <a:effectLst>
-            <a:outerShdw blurRad="40000" dist="23000" dir="5400000" rotWithShape="0">
+            <a:outerShdw blurRad="39000" dist="25400" dir="5400000" rotWithShape="0">
               <a:srgbClr val="000000">
-                <a:alpha val="35000"/>
+                <a:alpha val="38000"/>
               </a:srgbClr>
             </a:outerShdw>
           </a:effectLst>
           <a:scene3d>
-            <a:camera prst="orthographicFront">
+            <a:camera prst="orthographicFront" fov="0">
               <a:rot lat="0" lon="0" rev="0"/>
             </a:camera>
             <a:lightRig rig="threePt" dir="t">
-              <a:rot lat="0" lon="0" rev="1200000"/>
+              <a:rot lat="0" lon="0" rev="1800000"/>
             </a:lightRig>
           </a:scene3d>
-          <a:sp3d>
-            <a:bevelT w="63500" h="25400"/>
+          <a:sp3d prstMaterial="matte">
+            <a:bevelT h="20000"/>
           </a:sp3d>
         </a:effectStyle>
       </a:effectStyleLst>
@@ -3783,47 +4604,47 @@
           <a:gsLst>
             <a:gs pos="0">
               <a:schemeClr val="phClr">
-                <a:tint val="40000"/>
-                <a:satMod val="350000"/>
+                <a:tint val="48000"/>
+                <a:satMod val="300000"/>
               </a:schemeClr>
             </a:gs>
-            <a:gs pos="40000">
+            <a:gs pos="12000">
               <a:schemeClr val="phClr">
-                <a:tint val="45000"/>
-                <a:shade val="99000"/>
-                <a:satMod val="350000"/>
+                <a:tint val="48000"/>
+                <a:satMod val="300000"/>
               </a:schemeClr>
             </a:gs>
-            <a:gs pos="100000">
+            <a:gs pos="20000">
               <a:schemeClr val="phClr">
-                <a:shade val="20000"/>
-                <a:satMod val="255000"/>
-              </a:schemeClr>
-            </a:gs>
-          </a:gsLst>
-          <a:path path="circle">
-            <a:fillToRect l="50000" t="-80000" r="50000" b="180000"/>
-          </a:path>
-        </a:gradFill>
-        <a:gradFill rotWithShape="1">
-          <a:gsLst>
-            <a:gs pos="0">
-              <a:schemeClr val="phClr">
-                <a:tint val="80000"/>
+                <a:tint val="49000"/>
                 <a:satMod val="300000"/>
               </a:schemeClr>
             </a:gs>
             <a:gs pos="100000">
               <a:schemeClr val="phClr">
                 <a:shade val="30000"/>
-                <a:satMod val="200000"/>
               </a:schemeClr>
             </a:gs>
           </a:gsLst>
           <a:path path="circle">
-            <a:fillToRect l="50000" t="50000" r="50000" b="50000"/>
+            <a:fillToRect l="10000" t="-25000" r="10000" b="125000"/>
           </a:path>
         </a:gradFill>
+        <a:blipFill>
+          <a:blip xmlns:r="http://schemas.openxmlformats.org/officeDocument/2006/relationships" r:embed="rId1">
+            <a:duotone>
+              <a:schemeClr val="phClr">
+                <a:shade val="75000"/>
+                <a:satMod val="105000"/>
+              </a:schemeClr>
+              <a:schemeClr val="phClr">
+                <a:tint val="95000"/>
+                <a:satMod val="105000"/>
+              </a:schemeClr>
+            </a:duotone>
+          </a:blip>
+          <a:tile tx="0" ty="0" sx="38000" sy="38000" flip="none" algn="tl"/>
+        </a:blipFill>
       </a:bgFillStyleLst>
     </a:fmtScheme>
   </a:themeElements>

</xml_diff>